<commit_message>
include "business goal" in arc42 documentation
</commit_message>
<xml_diff>
--- a/src/HTMLSC-presentation.pptx
+++ b/src/HTMLSC-presentation.pptx
@@ -4,33 +4,37 @@
   <p:sldMasterIdLst>
     <p:sldMasterId id="2147493455" r:id="rId4"/>
   </p:sldMasterIdLst>
+  <p:notesMasterIdLst>
+    <p:notesMasterId r:id="rId32"/>
+  </p:notesMasterIdLst>
   <p:sldIdLst>
     <p:sldId id="256" r:id="rId5"/>
     <p:sldId id="272" r:id="rId6"/>
-    <p:sldId id="257" r:id="rId7"/>
-    <p:sldId id="273" r:id="rId8"/>
-    <p:sldId id="269" r:id="rId9"/>
-    <p:sldId id="270" r:id="rId10"/>
-    <p:sldId id="258" r:id="rId11"/>
-    <p:sldId id="271" r:id="rId12"/>
-    <p:sldId id="274" r:id="rId13"/>
-    <p:sldId id="259" r:id="rId14"/>
-    <p:sldId id="260" r:id="rId15"/>
-    <p:sldId id="281" r:id="rId16"/>
-    <p:sldId id="261" r:id="rId17"/>
-    <p:sldId id="262" r:id="rId18"/>
-    <p:sldId id="275" r:id="rId19"/>
-    <p:sldId id="280" r:id="rId20"/>
-    <p:sldId id="276" r:id="rId21"/>
-    <p:sldId id="278" r:id="rId22"/>
-    <p:sldId id="279" r:id="rId23"/>
-    <p:sldId id="263" r:id="rId24"/>
-    <p:sldId id="264" r:id="rId25"/>
-    <p:sldId id="265" r:id="rId26"/>
-    <p:sldId id="277" r:id="rId27"/>
-    <p:sldId id="266" r:id="rId28"/>
-    <p:sldId id="267" r:id="rId29"/>
-    <p:sldId id="268" r:id="rId30"/>
+    <p:sldId id="283" r:id="rId7"/>
+    <p:sldId id="282" r:id="rId8"/>
+    <p:sldId id="273" r:id="rId9"/>
+    <p:sldId id="269" r:id="rId10"/>
+    <p:sldId id="270" r:id="rId11"/>
+    <p:sldId id="258" r:id="rId12"/>
+    <p:sldId id="271" r:id="rId13"/>
+    <p:sldId id="274" r:id="rId14"/>
+    <p:sldId id="259" r:id="rId15"/>
+    <p:sldId id="260" r:id="rId16"/>
+    <p:sldId id="281" r:id="rId17"/>
+    <p:sldId id="261" r:id="rId18"/>
+    <p:sldId id="262" r:id="rId19"/>
+    <p:sldId id="275" r:id="rId20"/>
+    <p:sldId id="280" r:id="rId21"/>
+    <p:sldId id="276" r:id="rId22"/>
+    <p:sldId id="278" r:id="rId23"/>
+    <p:sldId id="279" r:id="rId24"/>
+    <p:sldId id="263" r:id="rId25"/>
+    <p:sldId id="264" r:id="rId26"/>
+    <p:sldId id="265" r:id="rId27"/>
+    <p:sldId id="277" r:id="rId28"/>
+    <p:sldId id="266" r:id="rId29"/>
+    <p:sldId id="267" r:id="rId30"/>
+    <p:sldId id="268" r:id="rId31"/>
   </p:sldIdLst>
   <p:sldSz cx="9144000" cy="6858000" type="screen4x3"/>
   <p:notesSz cx="6858000" cy="9144000"/>
@@ -130,6 +134,472 @@
     </a:lvl9pPr>
   </p:defaultTextStyle>
 </p:presentation>
+</file>
+
+<file path=ppt/notesMasters/notesMaster1.xml><?xml version="1.0" encoding="utf-8"?>
+<p:notesMaster xmlns:a="http://schemas.openxmlformats.org/drawingml/2006/main" xmlns:r="http://schemas.openxmlformats.org/officeDocument/2006/relationships" xmlns:p="http://schemas.openxmlformats.org/presentationml/2006/main">
+  <p:cSld>
+    <p:bg>
+      <p:bgRef idx="1001">
+        <a:schemeClr val="bg1"/>
+      </p:bgRef>
+    </p:bg>
+    <p:spTree>
+      <p:nvGrpSpPr>
+        <p:cNvPr id="1" name=""/>
+        <p:cNvGrpSpPr/>
+        <p:nvPr/>
+      </p:nvGrpSpPr>
+      <p:grpSpPr>
+        <a:xfrm>
+          <a:off x="0" y="0"/>
+          <a:ext cx="0" cy="0"/>
+          <a:chOff x="0" y="0"/>
+          <a:chExt cx="0" cy="0"/>
+        </a:xfrm>
+      </p:grpSpPr>
+      <p:sp>
+        <p:nvSpPr>
+          <p:cNvPr id="2" name="Überschriftenplatzhalter 1"/>
+          <p:cNvSpPr>
+            <a:spLocks noGrp="1"/>
+          </p:cNvSpPr>
+          <p:nvPr>
+            <p:ph type="hdr" sz="quarter"/>
+          </p:nvPr>
+        </p:nvSpPr>
+        <p:spPr>
+          <a:xfrm>
+            <a:off x="0" y="0"/>
+            <a:ext cx="2971800" cy="457200"/>
+          </a:xfrm>
+          <a:prstGeom prst="rect">
+            <a:avLst/>
+          </a:prstGeom>
+        </p:spPr>
+        <p:txBody>
+          <a:bodyPr vert="horz" lIns="91440" tIns="45720" rIns="91440" bIns="45720" rtlCol="0"/>
+          <a:lstStyle>
+            <a:lvl1pPr algn="l">
+              <a:defRPr sz="1200"/>
+            </a:lvl1pPr>
+          </a:lstStyle>
+          <a:p>
+            <a:endParaRPr lang="de-DE"/>
+          </a:p>
+        </p:txBody>
+      </p:sp>
+      <p:sp>
+        <p:nvSpPr>
+          <p:cNvPr id="3" name="Datumsplatzhalter 2"/>
+          <p:cNvSpPr>
+            <a:spLocks noGrp="1"/>
+          </p:cNvSpPr>
+          <p:nvPr>
+            <p:ph type="dt" idx="1"/>
+          </p:nvPr>
+        </p:nvSpPr>
+        <p:spPr>
+          <a:xfrm>
+            <a:off x="3884613" y="0"/>
+            <a:ext cx="2971800" cy="457200"/>
+          </a:xfrm>
+          <a:prstGeom prst="rect">
+            <a:avLst/>
+          </a:prstGeom>
+        </p:spPr>
+        <p:txBody>
+          <a:bodyPr vert="horz" lIns="91440" tIns="45720" rIns="91440" bIns="45720" rtlCol="0"/>
+          <a:lstStyle>
+            <a:lvl1pPr algn="r">
+              <a:defRPr sz="1200"/>
+            </a:lvl1pPr>
+          </a:lstStyle>
+          <a:p>
+            <a:fld id="{8D5B56FA-5681-7B45-A9AB-DAAC523A404C}" type="datetimeFigureOut">
+              <a:rPr lang="de-DE" smtClean="0"/>
+              <a:t>19.09.15</a:t>
+            </a:fld>
+            <a:endParaRPr lang="de-DE"/>
+          </a:p>
+        </p:txBody>
+      </p:sp>
+      <p:sp>
+        <p:nvSpPr>
+          <p:cNvPr id="4" name="Folienbildplatzhalter 3"/>
+          <p:cNvSpPr>
+            <a:spLocks noGrp="1" noRot="1" noChangeAspect="1"/>
+          </p:cNvSpPr>
+          <p:nvPr>
+            <p:ph type="sldImg" idx="2"/>
+          </p:nvPr>
+        </p:nvSpPr>
+        <p:spPr>
+          <a:xfrm>
+            <a:off x="1143000" y="685800"/>
+            <a:ext cx="4572000" cy="3429000"/>
+          </a:xfrm>
+          <a:prstGeom prst="rect">
+            <a:avLst/>
+          </a:prstGeom>
+          <a:noFill/>
+          <a:ln w="12700">
+            <a:solidFill>
+              <a:prstClr val="black"/>
+            </a:solidFill>
+          </a:ln>
+        </p:spPr>
+        <p:txBody>
+          <a:bodyPr vert="horz" lIns="91440" tIns="45720" rIns="91440" bIns="45720" rtlCol="0" anchor="ctr"/>
+          <a:lstStyle/>
+          <a:p>
+            <a:endParaRPr lang="de-DE"/>
+          </a:p>
+        </p:txBody>
+      </p:sp>
+      <p:sp>
+        <p:nvSpPr>
+          <p:cNvPr id="5" name="Notizenplatzhalter 4"/>
+          <p:cNvSpPr>
+            <a:spLocks noGrp="1"/>
+          </p:cNvSpPr>
+          <p:nvPr>
+            <p:ph type="body" sz="quarter" idx="3"/>
+          </p:nvPr>
+        </p:nvSpPr>
+        <p:spPr>
+          <a:xfrm>
+            <a:off x="685800" y="4343400"/>
+            <a:ext cx="5486400" cy="4114800"/>
+          </a:xfrm>
+          <a:prstGeom prst="rect">
+            <a:avLst/>
+          </a:prstGeom>
+        </p:spPr>
+        <p:txBody>
+          <a:bodyPr vert="horz" lIns="91440" tIns="45720" rIns="91440" bIns="45720" rtlCol="0"/>
+          <a:lstStyle/>
+          <a:p>
+            <a:pPr lvl="0"/>
+            <a:r>
+              <a:rPr lang="de-DE" smtClean="0"/>
+              <a:t>Mastertextformat bearbeiten</a:t>
+            </a:r>
+          </a:p>
+          <a:p>
+            <a:pPr lvl="1"/>
+            <a:r>
+              <a:rPr lang="de-DE" smtClean="0"/>
+              <a:t>Zweite Ebene</a:t>
+            </a:r>
+          </a:p>
+          <a:p>
+            <a:pPr lvl="2"/>
+            <a:r>
+              <a:rPr lang="de-DE" smtClean="0"/>
+              <a:t>Dritte Ebene</a:t>
+            </a:r>
+          </a:p>
+          <a:p>
+            <a:pPr lvl="3"/>
+            <a:r>
+              <a:rPr lang="de-DE" smtClean="0"/>
+              <a:t>Vierte Ebene</a:t>
+            </a:r>
+          </a:p>
+          <a:p>
+            <a:pPr lvl="4"/>
+            <a:r>
+              <a:rPr lang="de-DE" smtClean="0"/>
+              <a:t>Fünfte Ebene</a:t>
+            </a:r>
+            <a:endParaRPr lang="de-DE"/>
+          </a:p>
+        </p:txBody>
+      </p:sp>
+      <p:sp>
+        <p:nvSpPr>
+          <p:cNvPr id="6" name="Fußzeilenplatzhalter 5"/>
+          <p:cNvSpPr>
+            <a:spLocks noGrp="1"/>
+          </p:cNvSpPr>
+          <p:nvPr>
+            <p:ph type="ftr" sz="quarter" idx="4"/>
+          </p:nvPr>
+        </p:nvSpPr>
+        <p:spPr>
+          <a:xfrm>
+            <a:off x="0" y="8685213"/>
+            <a:ext cx="2971800" cy="457200"/>
+          </a:xfrm>
+          <a:prstGeom prst="rect">
+            <a:avLst/>
+          </a:prstGeom>
+        </p:spPr>
+        <p:txBody>
+          <a:bodyPr vert="horz" lIns="91440" tIns="45720" rIns="91440" bIns="45720" rtlCol="0" anchor="b"/>
+          <a:lstStyle>
+            <a:lvl1pPr algn="l">
+              <a:defRPr sz="1200"/>
+            </a:lvl1pPr>
+          </a:lstStyle>
+          <a:p>
+            <a:endParaRPr lang="de-DE"/>
+          </a:p>
+        </p:txBody>
+      </p:sp>
+      <p:sp>
+        <p:nvSpPr>
+          <p:cNvPr id="7" name="Foliennummernplatzhalter 6"/>
+          <p:cNvSpPr>
+            <a:spLocks noGrp="1"/>
+          </p:cNvSpPr>
+          <p:nvPr>
+            <p:ph type="sldNum" sz="quarter" idx="5"/>
+          </p:nvPr>
+        </p:nvSpPr>
+        <p:spPr>
+          <a:xfrm>
+            <a:off x="3884613" y="8685213"/>
+            <a:ext cx="2971800" cy="457200"/>
+          </a:xfrm>
+          <a:prstGeom prst="rect">
+            <a:avLst/>
+          </a:prstGeom>
+        </p:spPr>
+        <p:txBody>
+          <a:bodyPr vert="horz" lIns="91440" tIns="45720" rIns="91440" bIns="45720" rtlCol="0" anchor="b"/>
+          <a:lstStyle>
+            <a:lvl1pPr algn="r">
+              <a:defRPr sz="1200"/>
+            </a:lvl1pPr>
+          </a:lstStyle>
+          <a:p>
+            <a:fld id="{43DB4AB9-383F-2347-AC0B-3A4BEE107B57}" type="slidenum">
+              <a:rPr lang="de-DE" smtClean="0"/>
+              <a:t>‹Nr.›</a:t>
+            </a:fld>
+            <a:endParaRPr lang="de-DE"/>
+          </a:p>
+        </p:txBody>
+      </p:sp>
+    </p:spTree>
+    <p:extLst>
+      <p:ext uri="{BB962C8B-B14F-4D97-AF65-F5344CB8AC3E}">
+        <p14:creationId xmlns:p14="http://schemas.microsoft.com/office/powerpoint/2010/main" val="711921225"/>
+      </p:ext>
+    </p:extLst>
+  </p:cSld>
+  <p:clrMap bg1="lt1" tx1="dk1" bg2="lt2" tx2="dk2" accent1="accent1" accent2="accent2" accent3="accent3" accent4="accent4" accent5="accent5" accent6="accent6" hlink="hlink" folHlink="folHlink"/>
+  <p:notesStyle>
+    <a:lvl1pPr marL="0" algn="l" defTabSz="457200" rtl="0" eaLnBrk="1" latinLnBrk="0" hangingPunct="1">
+      <a:defRPr sz="1200" kern="1200">
+        <a:solidFill>
+          <a:schemeClr val="tx1"/>
+        </a:solidFill>
+        <a:latin typeface="+mn-lt"/>
+        <a:ea typeface="+mn-ea"/>
+        <a:cs typeface="+mn-cs"/>
+      </a:defRPr>
+    </a:lvl1pPr>
+    <a:lvl2pPr marL="457200" algn="l" defTabSz="457200" rtl="0" eaLnBrk="1" latinLnBrk="0" hangingPunct="1">
+      <a:defRPr sz="1200" kern="1200">
+        <a:solidFill>
+          <a:schemeClr val="tx1"/>
+        </a:solidFill>
+        <a:latin typeface="+mn-lt"/>
+        <a:ea typeface="+mn-ea"/>
+        <a:cs typeface="+mn-cs"/>
+      </a:defRPr>
+    </a:lvl2pPr>
+    <a:lvl3pPr marL="914400" algn="l" defTabSz="457200" rtl="0" eaLnBrk="1" latinLnBrk="0" hangingPunct="1">
+      <a:defRPr sz="1200" kern="1200">
+        <a:solidFill>
+          <a:schemeClr val="tx1"/>
+        </a:solidFill>
+        <a:latin typeface="+mn-lt"/>
+        <a:ea typeface="+mn-ea"/>
+        <a:cs typeface="+mn-cs"/>
+      </a:defRPr>
+    </a:lvl3pPr>
+    <a:lvl4pPr marL="1371600" algn="l" defTabSz="457200" rtl="0" eaLnBrk="1" latinLnBrk="0" hangingPunct="1">
+      <a:defRPr sz="1200" kern="1200">
+        <a:solidFill>
+          <a:schemeClr val="tx1"/>
+        </a:solidFill>
+        <a:latin typeface="+mn-lt"/>
+        <a:ea typeface="+mn-ea"/>
+        <a:cs typeface="+mn-cs"/>
+      </a:defRPr>
+    </a:lvl4pPr>
+    <a:lvl5pPr marL="1828800" algn="l" defTabSz="457200" rtl="0" eaLnBrk="1" latinLnBrk="0" hangingPunct="1">
+      <a:defRPr sz="1200" kern="1200">
+        <a:solidFill>
+          <a:schemeClr val="tx1"/>
+        </a:solidFill>
+        <a:latin typeface="+mn-lt"/>
+        <a:ea typeface="+mn-ea"/>
+        <a:cs typeface="+mn-cs"/>
+      </a:defRPr>
+    </a:lvl5pPr>
+    <a:lvl6pPr marL="2286000" algn="l" defTabSz="457200" rtl="0" eaLnBrk="1" latinLnBrk="0" hangingPunct="1">
+      <a:defRPr sz="1200" kern="1200">
+        <a:solidFill>
+          <a:schemeClr val="tx1"/>
+        </a:solidFill>
+        <a:latin typeface="+mn-lt"/>
+        <a:ea typeface="+mn-ea"/>
+        <a:cs typeface="+mn-cs"/>
+      </a:defRPr>
+    </a:lvl6pPr>
+    <a:lvl7pPr marL="2743200" algn="l" defTabSz="457200" rtl="0" eaLnBrk="1" latinLnBrk="0" hangingPunct="1">
+      <a:defRPr sz="1200" kern="1200">
+        <a:solidFill>
+          <a:schemeClr val="tx1"/>
+        </a:solidFill>
+        <a:latin typeface="+mn-lt"/>
+        <a:ea typeface="+mn-ea"/>
+        <a:cs typeface="+mn-cs"/>
+      </a:defRPr>
+    </a:lvl7pPr>
+    <a:lvl8pPr marL="3200400" algn="l" defTabSz="457200" rtl="0" eaLnBrk="1" latinLnBrk="0" hangingPunct="1">
+      <a:defRPr sz="1200" kern="1200">
+        <a:solidFill>
+          <a:schemeClr val="tx1"/>
+        </a:solidFill>
+        <a:latin typeface="+mn-lt"/>
+        <a:ea typeface="+mn-ea"/>
+        <a:cs typeface="+mn-cs"/>
+      </a:defRPr>
+    </a:lvl8pPr>
+    <a:lvl9pPr marL="3657600" algn="l" defTabSz="457200" rtl="0" eaLnBrk="1" latinLnBrk="0" hangingPunct="1">
+      <a:defRPr sz="1200" kern="1200">
+        <a:solidFill>
+          <a:schemeClr val="tx1"/>
+        </a:solidFill>
+        <a:latin typeface="+mn-lt"/>
+        <a:ea typeface="+mn-ea"/>
+        <a:cs typeface="+mn-cs"/>
+      </a:defRPr>
+    </a:lvl9pPr>
+  </p:notesStyle>
+</p:notesMaster>
+</file>
+
+<file path=ppt/notesSlides/notesSlide1.xml><?xml version="1.0" encoding="utf-8"?>
+<p:notes xmlns:a="http://schemas.openxmlformats.org/drawingml/2006/main" xmlns:r="http://schemas.openxmlformats.org/officeDocument/2006/relationships" xmlns:p="http://schemas.openxmlformats.org/presentationml/2006/main">
+  <p:cSld>
+    <p:spTree>
+      <p:nvGrpSpPr>
+        <p:cNvPr id="1" name=""/>
+        <p:cNvGrpSpPr/>
+        <p:nvPr/>
+      </p:nvGrpSpPr>
+      <p:grpSpPr>
+        <a:xfrm>
+          <a:off x="0" y="0"/>
+          <a:ext cx="0" cy="0"/>
+          <a:chOff x="0" y="0"/>
+          <a:chExt cx="0" cy="0"/>
+        </a:xfrm>
+      </p:grpSpPr>
+      <p:sp>
+        <p:nvSpPr>
+          <p:cNvPr id="2" name="Folienbildplatzhalter 1"/>
+          <p:cNvSpPr>
+            <a:spLocks noGrp="1" noRot="1" noChangeAspect="1"/>
+          </p:cNvSpPr>
+          <p:nvPr>
+            <p:ph type="sldImg"/>
+          </p:nvPr>
+        </p:nvSpPr>
+        <p:spPr/>
+      </p:sp>
+      <p:sp>
+        <p:nvSpPr>
+          <p:cNvPr id="3" name="Notizenplatzhalter 2"/>
+          <p:cNvSpPr>
+            <a:spLocks noGrp="1"/>
+          </p:cNvSpPr>
+          <p:nvPr>
+            <p:ph type="body" idx="1"/>
+          </p:nvPr>
+        </p:nvSpPr>
+        <p:spPr/>
+        <p:txBody>
+          <a:bodyPr/>
+          <a:lstStyle/>
+          <a:p>
+            <a:r>
+              <a:rPr lang="de-DE" dirty="0" smtClean="0"/>
+              <a:t>2015.09.19,</a:t>
+            </a:r>
+            <a:r>
+              <a:rPr lang="de-DE" baseline="0" dirty="0" smtClean="0"/>
+              <a:t> GS: </a:t>
+            </a:r>
+            <a:r>
+              <a:rPr lang="de-DE" dirty="0" err="1" smtClean="0"/>
+              <a:t>added</a:t>
+            </a:r>
+            <a:r>
+              <a:rPr lang="de-DE" dirty="0" smtClean="0"/>
+              <a:t> „</a:t>
+            </a:r>
+            <a:r>
+              <a:rPr lang="de-DE" dirty="0" err="1" smtClean="0"/>
+              <a:t>business</a:t>
+            </a:r>
+            <a:r>
+              <a:rPr lang="de-DE" baseline="0" dirty="0" smtClean="0"/>
+              <a:t> </a:t>
+            </a:r>
+            <a:r>
+              <a:rPr lang="de-DE" baseline="0" dirty="0" err="1" smtClean="0"/>
+              <a:t>goal</a:t>
+            </a:r>
+            <a:r>
+              <a:rPr lang="de-DE" baseline="0" dirty="0" smtClean="0"/>
+              <a:t>“</a:t>
+            </a:r>
+            <a:endParaRPr lang="de-DE" dirty="0"/>
+          </a:p>
+        </p:txBody>
+      </p:sp>
+      <p:sp>
+        <p:nvSpPr>
+          <p:cNvPr id="4" name="Foliennummernplatzhalter 3"/>
+          <p:cNvSpPr>
+            <a:spLocks noGrp="1"/>
+          </p:cNvSpPr>
+          <p:nvPr>
+            <p:ph type="sldNum" sz="quarter" idx="10"/>
+          </p:nvPr>
+        </p:nvSpPr>
+        <p:spPr/>
+        <p:txBody>
+          <a:bodyPr/>
+          <a:lstStyle/>
+          <a:p>
+            <a:fld id="{43DB4AB9-383F-2347-AC0B-3A4BEE107B57}" type="slidenum">
+              <a:rPr lang="de-DE" smtClean="0"/>
+              <a:t>1</a:t>
+            </a:fld>
+            <a:endParaRPr lang="de-DE"/>
+          </a:p>
+        </p:txBody>
+      </p:sp>
+    </p:spTree>
+    <p:extLst>
+      <p:ext uri="{BB962C8B-B14F-4D97-AF65-F5344CB8AC3E}">
+        <p14:creationId xmlns:p14="http://schemas.microsoft.com/office/powerpoint/2010/main" val="4112602662"/>
+      </p:ext>
+    </p:extLst>
+  </p:cSld>
+  <p:clrMapOvr>
+    <a:masterClrMapping/>
+  </p:clrMapOvr>
+</p:notes>
 </file>
 
 <file path=ppt/slideLayouts/slideLayout1.xml><?xml version="1.0" encoding="utf-8"?>
@@ -314,7 +784,7 @@
             <a:fld id="{8ACDB3CC-F982-40F9-8DD6-BCC9AFBF44BD}" type="datetime1">
               <a:rPr lang="en-US" smtClean="0"/>
               <a:pPr/>
-              <a:t>13.08.15</a:t>
+              <a:t>19.09.15</a:t>
             </a:fld>
             <a:endParaRPr lang="en-US" dirty="0"/>
           </a:p>
@@ -484,7 +954,7 @@
           <a:p>
             <a:fld id="{68C2560D-EC28-3B41-86E8-18F1CE0113B4}" type="datetimeFigureOut">
               <a:rPr lang="en-US" smtClean="0"/>
-              <a:t>13.08.15</a:t>
+              <a:t>19.09.15</a:t>
             </a:fld>
             <a:endParaRPr lang="en-US"/>
           </a:p>
@@ -731,7 +1201,7 @@
             <a:fld id="{4A9E7B99-7C3F-4BC3-B7B8-7E1F8C620B24}" type="datetime1">
               <a:rPr lang="en-US" smtClean="0"/>
               <a:pPr/>
-              <a:t>13.08.15</a:t>
+              <a:t>19.09.15</a:t>
             </a:fld>
             <a:endParaRPr lang="en-US"/>
           </a:p>
@@ -1020,7 +1490,7 @@
           <a:p>
             <a:fld id="{68C2560D-EC28-3B41-86E8-18F1CE0113B4}" type="datetimeFigureOut">
               <a:rPr lang="en-US" smtClean="0"/>
-              <a:t>13.08.15</a:t>
+              <a:t>19.09.15</a:t>
             </a:fld>
             <a:endParaRPr lang="en-US"/>
           </a:p>
@@ -1442,7 +1912,7 @@
           <a:p>
             <a:fld id="{68C2560D-EC28-3B41-86E8-18F1CE0113B4}" type="datetimeFigureOut">
               <a:rPr lang="en-US" smtClean="0"/>
-              <a:t>13.08.15</a:t>
+              <a:t>19.09.15</a:t>
             </a:fld>
             <a:endParaRPr lang="en-US"/>
           </a:p>
@@ -1560,7 +2030,7 @@
           <a:p>
             <a:fld id="{68C2560D-EC28-3B41-86E8-18F1CE0113B4}" type="datetimeFigureOut">
               <a:rPr lang="en-US" smtClean="0"/>
-              <a:t>13.08.15</a:t>
+              <a:t>19.09.15</a:t>
             </a:fld>
             <a:endParaRPr lang="en-US"/>
           </a:p>
@@ -1773,7 +2243,7 @@
           <a:p>
             <a:fld id="{68C2560D-EC28-3B41-86E8-18F1CE0113B4}" type="datetimeFigureOut">
               <a:rPr lang="en-US" smtClean="0"/>
-              <a:t>13.08.15</a:t>
+              <a:t>19.09.15</a:t>
             </a:fld>
             <a:endParaRPr lang="en-US"/>
           </a:p>
@@ -2238,7 +2708,7 @@
           <p:nvPr/>
         </p:nvPicPr>
         <p:blipFill>
-          <a:blip r:embed="rId2">
+          <a:blip r:embed="rId3">
             <a:extLst>
               <a:ext uri="{28A0092B-C50C-407E-A947-70E740481C1C}">
                 <a14:useLocalDpi xmlns:a14="http://schemas.microsoft.com/office/drawing/2010/main" val="0"/>
@@ -2268,7 +2738,7 @@
           <p:nvPr/>
         </p:nvPicPr>
         <p:blipFill>
-          <a:blip r:embed="rId3">
+          <a:blip r:embed="rId4">
             <a:extLst>
               <a:ext uri="{28A0092B-C50C-407E-A947-70E740481C1C}">
                 <a14:useLocalDpi xmlns:a14="http://schemas.microsoft.com/office/drawing/2010/main" val="0"/>
@@ -2569,6 +3039,763 @@
           <a:p>
             <a:r>
               <a:rPr lang="de-DE" dirty="0" err="1" smtClean="0"/>
+              <a:t>Architecture</a:t>
+            </a:r>
+            <a:r>
+              <a:rPr lang="de-DE" dirty="0" smtClean="0"/>
+              <a:t> Quality Goals</a:t>
+            </a:r>
+            <a:endParaRPr lang="de-DE" dirty="0"/>
+          </a:p>
+        </p:txBody>
+      </p:sp>
+      <p:graphicFrame>
+        <p:nvGraphicFramePr>
+          <p:cNvPr id="5" name="Tabelle 4"/>
+          <p:cNvGraphicFramePr>
+            <a:graphicFrameLocks noGrp="1"/>
+          </p:cNvGraphicFramePr>
+          <p:nvPr>
+            <p:extLst>
+              <p:ext uri="{D42A27DB-BD31-4B8C-83A1-F6EECF244321}">
+                <p14:modId xmlns:p14="http://schemas.microsoft.com/office/powerpoint/2010/main" val="804301138"/>
+              </p:ext>
+            </p:extLst>
+          </p:nvPr>
+        </p:nvGraphicFramePr>
+        <p:xfrm>
+          <a:off x="359217" y="1789822"/>
+          <a:ext cx="8505747" cy="4089400"/>
+        </p:xfrm>
+        <a:graphic>
+          <a:graphicData uri="http://schemas.openxmlformats.org/drawingml/2006/table">
+            <a:tbl>
+              <a:tblPr firstRow="1" bandRow="1">
+                <a:tableStyleId>{22838BEF-8BB2-4498-84A7-C5851F593DF1}</a:tableStyleId>
+              </a:tblPr>
+              <a:tblGrid>
+                <a:gridCol w="1195739"/>
+                <a:gridCol w="1883265"/>
+                <a:gridCol w="5426743"/>
+              </a:tblGrid>
+              <a:tr h="370840">
+                <a:tc>
+                  <a:txBody>
+                    <a:bodyPr/>
+                    <a:lstStyle/>
+                    <a:p>
+                      <a:r>
+                        <a:rPr lang="de-DE" dirty="0" err="1" smtClean="0"/>
+                        <a:t>Priority</a:t>
+                      </a:r>
+                      <a:endParaRPr lang="de-DE" dirty="0"/>
+                    </a:p>
+                  </a:txBody>
+                  <a:tcPr/>
+                </a:tc>
+                <a:tc>
+                  <a:txBody>
+                    <a:bodyPr/>
+                    <a:lstStyle/>
+                    <a:p>
+                      <a:r>
+                        <a:rPr lang="de-DE" dirty="0" smtClean="0"/>
+                        <a:t>Quality Goal</a:t>
+                      </a:r>
+                      <a:endParaRPr lang="de-DE" dirty="0"/>
+                    </a:p>
+                  </a:txBody>
+                  <a:tcPr/>
+                </a:tc>
+                <a:tc>
+                  <a:txBody>
+                    <a:bodyPr/>
+                    <a:lstStyle/>
+                    <a:p>
+                      <a:r>
+                        <a:rPr lang="de-DE" dirty="0" smtClean="0"/>
+                        <a:t>Scenario</a:t>
+                      </a:r>
+                      <a:endParaRPr lang="de-DE" dirty="0"/>
+                    </a:p>
+                  </a:txBody>
+                  <a:tcPr/>
+                </a:tc>
+              </a:tr>
+              <a:tr h="370840">
+                <a:tc>
+                  <a:txBody>
+                    <a:bodyPr/>
+                    <a:lstStyle/>
+                    <a:p>
+                      <a:r>
+                        <a:rPr lang="de-DE" dirty="0" smtClean="0"/>
+                        <a:t>1</a:t>
+                      </a:r>
+                      <a:endParaRPr lang="de-DE" dirty="0"/>
+                    </a:p>
+                  </a:txBody>
+                  <a:tcPr/>
+                </a:tc>
+                <a:tc>
+                  <a:txBody>
+                    <a:bodyPr/>
+                    <a:lstStyle/>
+                    <a:p>
+                      <a:r>
+                        <a:rPr lang="de-DE" sz="2400" dirty="0" smtClean="0"/>
+                        <a:t>Correctness</a:t>
+                      </a:r>
+                      <a:endParaRPr lang="de-DE" sz="2400" dirty="0"/>
+                    </a:p>
+                  </a:txBody>
+                  <a:tcPr/>
+                </a:tc>
+                <a:tc>
+                  <a:txBody>
+                    <a:bodyPr/>
+                    <a:lstStyle/>
+                    <a:p>
+                      <a:r>
+                        <a:rPr lang="de-DE" sz="2000" dirty="0" smtClean="0"/>
+                        <a:t>Every </a:t>
+                      </a:r>
+                      <a:r>
+                        <a:rPr lang="de-DE" sz="2000" dirty="0" err="1" smtClean="0"/>
+                        <a:t>broken</a:t>
+                      </a:r>
+                      <a:r>
+                        <a:rPr lang="de-DE" sz="2000" dirty="0" smtClean="0"/>
+                        <a:t> </a:t>
+                      </a:r>
+                      <a:r>
+                        <a:rPr lang="de-DE" sz="2000" dirty="0" err="1" smtClean="0"/>
+                        <a:t>internal</a:t>
+                      </a:r>
+                      <a:r>
+                        <a:rPr lang="de-DE" sz="2000" dirty="0" smtClean="0"/>
+                        <a:t> link (</a:t>
+                      </a:r>
+                      <a:r>
+                        <a:rPr lang="de-DE" sz="2000" dirty="0" err="1" smtClean="0"/>
+                        <a:t>cross</a:t>
+                      </a:r>
+                      <a:r>
+                        <a:rPr lang="de-DE" sz="2000" dirty="0" smtClean="0"/>
+                        <a:t> </a:t>
+                      </a:r>
+                      <a:r>
+                        <a:rPr lang="de-DE" sz="2000" dirty="0" err="1" smtClean="0"/>
+                        <a:t>reference</a:t>
+                      </a:r>
+                      <a:r>
+                        <a:rPr lang="de-DE" sz="2000" dirty="0" smtClean="0"/>
+                        <a:t>) </a:t>
+                      </a:r>
+                      <a:r>
+                        <a:rPr lang="de-DE" sz="2000" dirty="0" err="1" smtClean="0"/>
+                        <a:t>is</a:t>
+                      </a:r>
+                      <a:r>
+                        <a:rPr lang="de-DE" sz="2000" dirty="0" smtClean="0"/>
+                        <a:t> </a:t>
+                      </a:r>
+                      <a:r>
+                        <a:rPr lang="de-DE" sz="2000" dirty="0" err="1" smtClean="0"/>
+                        <a:t>found</a:t>
+                      </a:r>
+                      <a:endParaRPr lang="de-DE" sz="2000" dirty="0"/>
+                    </a:p>
+                  </a:txBody>
+                  <a:tcPr/>
+                </a:tc>
+              </a:tr>
+              <a:tr h="370840">
+                <a:tc>
+                  <a:txBody>
+                    <a:bodyPr/>
+                    <a:lstStyle/>
+                    <a:p>
+                      <a:r>
+                        <a:rPr lang="de-DE" dirty="0" smtClean="0"/>
+                        <a:t>1</a:t>
+                      </a:r>
+                      <a:endParaRPr lang="de-DE" dirty="0"/>
+                    </a:p>
+                  </a:txBody>
+                  <a:tcPr/>
+                </a:tc>
+                <a:tc>
+                  <a:txBody>
+                    <a:bodyPr/>
+                    <a:lstStyle/>
+                    <a:p>
+                      <a:r>
+                        <a:rPr lang="de-DE" sz="2400" dirty="0" smtClean="0"/>
+                        <a:t>Correctness</a:t>
+                      </a:r>
+                      <a:endParaRPr lang="de-DE" sz="2400" dirty="0"/>
+                    </a:p>
+                  </a:txBody>
+                  <a:tcPr/>
+                </a:tc>
+                <a:tc>
+                  <a:txBody>
+                    <a:bodyPr/>
+                    <a:lstStyle/>
+                    <a:p>
+                      <a:r>
+                        <a:rPr lang="de-DE" sz="2000" dirty="0" smtClean="0"/>
+                        <a:t>Every </a:t>
+                      </a:r>
+                      <a:r>
+                        <a:rPr lang="de-DE" sz="2000" dirty="0" err="1" smtClean="0"/>
+                        <a:t>missing</a:t>
+                      </a:r>
+                      <a:r>
+                        <a:rPr lang="de-DE" sz="2000" dirty="0" smtClean="0"/>
+                        <a:t> </a:t>
+                      </a:r>
+                      <a:r>
+                        <a:rPr lang="de-DE" sz="2000" dirty="0" err="1" smtClean="0"/>
+                        <a:t>local</a:t>
+                      </a:r>
+                      <a:r>
+                        <a:rPr lang="de-DE" sz="2000" dirty="0" smtClean="0"/>
+                        <a:t> </a:t>
+                      </a:r>
+                      <a:r>
+                        <a:rPr lang="de-DE" sz="2000" dirty="0" err="1" smtClean="0"/>
+                        <a:t>image</a:t>
+                      </a:r>
+                      <a:r>
+                        <a:rPr lang="de-DE" sz="2000" dirty="0" smtClean="0"/>
+                        <a:t> </a:t>
+                      </a:r>
+                      <a:r>
+                        <a:rPr lang="de-DE" sz="2000" dirty="0" err="1" smtClean="0"/>
+                        <a:t>is</a:t>
+                      </a:r>
+                      <a:r>
+                        <a:rPr lang="de-DE" sz="2000" dirty="0" smtClean="0"/>
+                        <a:t> </a:t>
+                      </a:r>
+                      <a:r>
+                        <a:rPr lang="de-DE" sz="2000" dirty="0" err="1" smtClean="0"/>
+                        <a:t>found</a:t>
+                      </a:r>
+                      <a:r>
+                        <a:rPr lang="de-DE" sz="2000" dirty="0" smtClean="0"/>
+                        <a:t>.</a:t>
+                      </a:r>
+                      <a:endParaRPr lang="de-DE" sz="2000" dirty="0"/>
+                    </a:p>
+                  </a:txBody>
+                  <a:tcPr/>
+                </a:tc>
+              </a:tr>
+              <a:tr h="370840">
+                <a:tc>
+                  <a:txBody>
+                    <a:bodyPr/>
+                    <a:lstStyle/>
+                    <a:p>
+                      <a:r>
+                        <a:rPr lang="de-DE" dirty="0" smtClean="0"/>
+                        <a:t>1</a:t>
+                      </a:r>
+                      <a:endParaRPr lang="de-DE" dirty="0"/>
+                    </a:p>
+                  </a:txBody>
+                  <a:tcPr/>
+                </a:tc>
+                <a:tc>
+                  <a:txBody>
+                    <a:bodyPr/>
+                    <a:lstStyle/>
+                    <a:p>
+                      <a:r>
+                        <a:rPr lang="de-DE" sz="2400" dirty="0" err="1" smtClean="0"/>
+                        <a:t>Safety</a:t>
+                      </a:r>
+                      <a:endParaRPr lang="de-DE" sz="2400" dirty="0"/>
+                    </a:p>
+                  </a:txBody>
+                  <a:tcPr/>
+                </a:tc>
+                <a:tc>
+                  <a:txBody>
+                    <a:bodyPr/>
+                    <a:lstStyle/>
+                    <a:p>
+                      <a:r>
+                        <a:rPr lang="de-DE" sz="2000" dirty="0" smtClean="0"/>
+                        <a:t>Content </a:t>
+                      </a:r>
+                      <a:r>
+                        <a:rPr lang="de-DE" sz="2000" dirty="0" err="1" smtClean="0"/>
+                        <a:t>of</a:t>
+                      </a:r>
+                      <a:r>
+                        <a:rPr lang="de-DE" sz="2000" dirty="0" smtClean="0"/>
+                        <a:t> </a:t>
+                      </a:r>
+                      <a:r>
+                        <a:rPr lang="de-DE" sz="2000" dirty="0" err="1" smtClean="0"/>
+                        <a:t>the</a:t>
+                      </a:r>
+                      <a:r>
+                        <a:rPr lang="de-DE" sz="2000" dirty="0" smtClean="0"/>
+                        <a:t> </a:t>
+                      </a:r>
+                      <a:r>
+                        <a:rPr lang="de-DE" sz="2000" dirty="0" err="1" smtClean="0"/>
+                        <a:t>files</a:t>
+                      </a:r>
+                      <a:r>
+                        <a:rPr lang="de-DE" sz="2000" dirty="0" smtClean="0"/>
+                        <a:t> </a:t>
+                      </a:r>
+                      <a:r>
+                        <a:rPr lang="de-DE" sz="2000" dirty="0" err="1" smtClean="0"/>
+                        <a:t>to</a:t>
+                      </a:r>
+                      <a:r>
+                        <a:rPr lang="de-DE" sz="2000" dirty="0" smtClean="0"/>
+                        <a:t> </a:t>
+                      </a:r>
+                      <a:r>
+                        <a:rPr lang="de-DE" sz="2000" dirty="0" err="1" smtClean="0"/>
+                        <a:t>be</a:t>
+                      </a:r>
+                      <a:r>
+                        <a:rPr lang="de-DE" sz="2000" dirty="0" smtClean="0"/>
+                        <a:t> </a:t>
+                      </a:r>
+                      <a:r>
+                        <a:rPr lang="de-DE" sz="2000" dirty="0" err="1" smtClean="0"/>
+                        <a:t>checked</a:t>
+                      </a:r>
+                      <a:r>
+                        <a:rPr lang="de-DE" sz="2000" dirty="0" smtClean="0"/>
+                        <a:t> </a:t>
+                      </a:r>
+                      <a:r>
+                        <a:rPr lang="de-DE" sz="2000" dirty="0" err="1" smtClean="0"/>
+                        <a:t>is</a:t>
+                      </a:r>
+                      <a:r>
+                        <a:rPr lang="de-DE" sz="2000" dirty="0" smtClean="0"/>
+                        <a:t> </a:t>
+                      </a:r>
+                      <a:r>
+                        <a:rPr lang="de-DE" sz="2000" i="1" dirty="0" err="1" smtClean="0"/>
+                        <a:t>never</a:t>
+                      </a:r>
+                      <a:r>
+                        <a:rPr lang="de-DE" sz="2000" dirty="0" smtClean="0"/>
+                        <a:t> </a:t>
+                      </a:r>
+                      <a:r>
+                        <a:rPr lang="de-DE" sz="2000" dirty="0" err="1" smtClean="0"/>
+                        <a:t>altered</a:t>
+                      </a:r>
+                      <a:r>
+                        <a:rPr lang="de-DE" sz="2000" dirty="0" smtClean="0"/>
+                        <a:t>.</a:t>
+                      </a:r>
+                      <a:endParaRPr lang="de-DE" sz="2000" dirty="0"/>
+                    </a:p>
+                  </a:txBody>
+                  <a:tcPr/>
+                </a:tc>
+              </a:tr>
+              <a:tr h="370840">
+                <a:tc>
+                  <a:txBody>
+                    <a:bodyPr/>
+                    <a:lstStyle/>
+                    <a:p>
+                      <a:r>
+                        <a:rPr lang="de-DE" dirty="0" smtClean="0"/>
+                        <a:t>2</a:t>
+                      </a:r>
+                      <a:endParaRPr lang="de-DE" dirty="0"/>
+                    </a:p>
+                  </a:txBody>
+                  <a:tcPr/>
+                </a:tc>
+                <a:tc>
+                  <a:txBody>
+                    <a:bodyPr/>
+                    <a:lstStyle/>
+                    <a:p>
+                      <a:r>
+                        <a:rPr lang="de-DE" sz="2400" dirty="0" smtClean="0"/>
+                        <a:t>Correctness</a:t>
+                      </a:r>
+                      <a:endParaRPr lang="de-DE" sz="2400" dirty="0"/>
+                    </a:p>
+                  </a:txBody>
+                  <a:tcPr/>
+                </a:tc>
+                <a:tc>
+                  <a:txBody>
+                    <a:bodyPr/>
+                    <a:lstStyle/>
+                    <a:p>
+                      <a:r>
+                        <a:rPr lang="de-DE" sz="2000" dirty="0" smtClean="0"/>
+                        <a:t>Correctness </a:t>
+                      </a:r>
+                      <a:r>
+                        <a:rPr lang="de-DE" sz="2000" dirty="0" err="1" smtClean="0"/>
+                        <a:t>of</a:t>
+                      </a:r>
+                      <a:r>
+                        <a:rPr lang="de-DE" sz="2000" dirty="0" smtClean="0"/>
+                        <a:t> </a:t>
+                      </a:r>
+                      <a:r>
+                        <a:rPr lang="de-DE" sz="2000" dirty="0" err="1" smtClean="0"/>
+                        <a:t>every</a:t>
+                      </a:r>
+                      <a:r>
+                        <a:rPr lang="de-DE" sz="2000" dirty="0" smtClean="0"/>
+                        <a:t> </a:t>
+                      </a:r>
+                      <a:r>
+                        <a:rPr lang="de-DE" sz="2000" dirty="0" err="1" smtClean="0"/>
+                        <a:t>checker</a:t>
+                      </a:r>
+                      <a:r>
+                        <a:rPr lang="de-DE" sz="2000" dirty="0" smtClean="0"/>
+                        <a:t> </a:t>
+                      </a:r>
+                      <a:r>
+                        <a:rPr lang="de-DE" sz="2000" dirty="0" err="1" smtClean="0"/>
+                        <a:t>is</a:t>
+                      </a:r>
+                      <a:r>
+                        <a:rPr lang="de-DE" sz="2000" dirty="0" smtClean="0"/>
+                        <a:t> </a:t>
+                      </a:r>
+                      <a:r>
+                        <a:rPr lang="de-DE" sz="2000" dirty="0" err="1" smtClean="0"/>
+                        <a:t>automatically</a:t>
+                      </a:r>
+                      <a:r>
+                        <a:rPr lang="de-DE" sz="2000" dirty="0" smtClean="0"/>
+                        <a:t> </a:t>
+                      </a:r>
+                      <a:r>
+                        <a:rPr lang="de-DE" sz="2000" dirty="0" err="1" smtClean="0"/>
+                        <a:t>tested</a:t>
+                      </a:r>
+                      <a:r>
+                        <a:rPr lang="de-DE" sz="2000" dirty="0" smtClean="0"/>
+                        <a:t> </a:t>
+                      </a:r>
+                      <a:r>
+                        <a:rPr lang="de-DE" sz="2000" dirty="0" err="1" smtClean="0"/>
+                        <a:t>for</a:t>
+                      </a:r>
+                      <a:r>
+                        <a:rPr lang="de-DE" sz="2000" dirty="0" smtClean="0"/>
+                        <a:t> positive AND negative </a:t>
+                      </a:r>
+                      <a:r>
+                        <a:rPr lang="de-DE" sz="2000" dirty="0" err="1" smtClean="0"/>
+                        <a:t>cases</a:t>
+                      </a:r>
+                      <a:endParaRPr lang="de-DE" sz="2000" dirty="0"/>
+                    </a:p>
+                  </a:txBody>
+                  <a:tcPr/>
+                </a:tc>
+              </a:tr>
+              <a:tr h="370840">
+                <a:tc>
+                  <a:txBody>
+                    <a:bodyPr/>
+                    <a:lstStyle/>
+                    <a:p>
+                      <a:r>
+                        <a:rPr lang="de-DE" dirty="0" smtClean="0"/>
+                        <a:t>3</a:t>
+                      </a:r>
+                      <a:endParaRPr lang="de-DE" dirty="0"/>
+                    </a:p>
+                  </a:txBody>
+                  <a:tcPr/>
+                </a:tc>
+                <a:tc>
+                  <a:txBody>
+                    <a:bodyPr/>
+                    <a:lstStyle/>
+                    <a:p>
+                      <a:r>
+                        <a:rPr lang="de-DE" sz="2400" dirty="0" smtClean="0"/>
+                        <a:t>Correctness</a:t>
+                      </a:r>
+                      <a:endParaRPr lang="de-DE" sz="2400" dirty="0"/>
+                    </a:p>
+                  </a:txBody>
+                  <a:tcPr/>
+                </a:tc>
+                <a:tc>
+                  <a:txBody>
+                    <a:bodyPr/>
+                    <a:lstStyle/>
+                    <a:p>
+                      <a:r>
+                        <a:rPr lang="de-DE" sz="2000" dirty="0" smtClean="0"/>
+                        <a:t>Every </a:t>
+                      </a:r>
+                      <a:r>
+                        <a:rPr lang="de-DE" sz="2000" dirty="0" err="1" smtClean="0"/>
+                        <a:t>reporting</a:t>
+                      </a:r>
+                      <a:r>
+                        <a:rPr lang="de-DE" sz="2000" dirty="0" smtClean="0"/>
+                        <a:t> </a:t>
+                      </a:r>
+                      <a:r>
+                        <a:rPr lang="de-DE" sz="2000" dirty="0" err="1" smtClean="0"/>
+                        <a:t>format</a:t>
+                      </a:r>
+                      <a:r>
+                        <a:rPr lang="de-DE" sz="2000" dirty="0" smtClean="0"/>
+                        <a:t> </a:t>
+                      </a:r>
+                      <a:r>
+                        <a:rPr lang="de-DE" sz="2000" dirty="0" err="1" smtClean="0"/>
+                        <a:t>is</a:t>
+                      </a:r>
+                      <a:r>
+                        <a:rPr lang="de-DE" sz="2000" dirty="0" smtClean="0"/>
+                        <a:t> </a:t>
+                      </a:r>
+                      <a:r>
+                        <a:rPr lang="de-DE" sz="2000" dirty="0" err="1" smtClean="0"/>
+                        <a:t>tested</a:t>
+                      </a:r>
+                      <a:r>
+                        <a:rPr lang="de-DE" sz="2000" dirty="0" smtClean="0"/>
+                        <a:t>: Reports must </a:t>
+                      </a:r>
+                      <a:r>
+                        <a:rPr lang="de-DE" sz="2000" dirty="0" err="1" smtClean="0"/>
+                        <a:t>exactly</a:t>
+                      </a:r>
+                      <a:r>
+                        <a:rPr lang="de-DE" sz="2000" dirty="0" smtClean="0"/>
+                        <a:t> </a:t>
+                      </a:r>
+                      <a:r>
+                        <a:rPr lang="de-DE" sz="2000" dirty="0" err="1" smtClean="0"/>
+                        <a:t>reflect</a:t>
+                      </a:r>
+                      <a:r>
+                        <a:rPr lang="de-DE" sz="2000" dirty="0" smtClean="0"/>
+                        <a:t> </a:t>
+                      </a:r>
+                      <a:r>
+                        <a:rPr lang="de-DE" sz="2000" dirty="0" err="1" smtClean="0"/>
+                        <a:t>checking</a:t>
+                      </a:r>
+                      <a:r>
+                        <a:rPr lang="de-DE" sz="2000" dirty="0" smtClean="0"/>
+                        <a:t> </a:t>
+                      </a:r>
+                      <a:r>
+                        <a:rPr lang="de-DE" sz="2000" dirty="0" err="1" smtClean="0"/>
+                        <a:t>results</a:t>
+                      </a:r>
+                      <a:r>
+                        <a:rPr lang="de-DE" sz="2000" dirty="0" smtClean="0"/>
+                        <a:t>.</a:t>
+                      </a:r>
+                      <a:endParaRPr lang="de-DE" sz="2000" dirty="0"/>
+                    </a:p>
+                  </a:txBody>
+                  <a:tcPr/>
+                </a:tc>
+              </a:tr>
+              <a:tr h="370840">
+                <a:tc>
+                  <a:txBody>
+                    <a:bodyPr/>
+                    <a:lstStyle/>
+                    <a:p>
+                      <a:r>
+                        <a:rPr lang="de-DE" dirty="0" smtClean="0"/>
+                        <a:t>3</a:t>
+                      </a:r>
+                      <a:endParaRPr lang="de-DE" dirty="0"/>
+                    </a:p>
+                  </a:txBody>
+                  <a:tcPr/>
+                </a:tc>
+                <a:tc>
+                  <a:txBody>
+                    <a:bodyPr/>
+                    <a:lstStyle/>
+                    <a:p>
+                      <a:r>
+                        <a:rPr lang="de-DE" sz="2400" dirty="0" smtClean="0"/>
+                        <a:t>Performance</a:t>
+                      </a:r>
+                      <a:endParaRPr lang="de-DE" sz="2400" dirty="0"/>
+                    </a:p>
+                  </a:txBody>
+                  <a:tcPr/>
+                </a:tc>
+                <a:tc>
+                  <a:txBody>
+                    <a:bodyPr/>
+                    <a:lstStyle/>
+                    <a:p>
+                      <a:r>
+                        <a:rPr lang="de-DE" sz="2000" dirty="0" smtClean="0"/>
+                        <a:t>Check </a:t>
+                      </a:r>
+                      <a:r>
+                        <a:rPr lang="de-DE" sz="2000" dirty="0" err="1" smtClean="0"/>
+                        <a:t>of</a:t>
+                      </a:r>
+                      <a:r>
+                        <a:rPr lang="de-DE" sz="2000" dirty="0" smtClean="0"/>
+                        <a:t> 100kB </a:t>
+                      </a:r>
+                      <a:r>
+                        <a:rPr lang="de-DE" sz="2000" dirty="0" err="1" smtClean="0"/>
+                        <a:t>html</a:t>
+                      </a:r>
+                      <a:r>
+                        <a:rPr lang="de-DE" sz="2000" dirty="0" smtClean="0"/>
+                        <a:t> </a:t>
+                      </a:r>
+                      <a:r>
+                        <a:rPr lang="de-DE" sz="2000" dirty="0" err="1" smtClean="0"/>
+                        <a:t>file</a:t>
+                      </a:r>
+                      <a:r>
+                        <a:rPr lang="de-DE" sz="2000" dirty="0" smtClean="0"/>
+                        <a:t> </a:t>
+                      </a:r>
+                      <a:r>
+                        <a:rPr lang="de-DE" sz="2000" dirty="0" err="1" smtClean="0"/>
+                        <a:t>performed</a:t>
+                      </a:r>
+                      <a:r>
+                        <a:rPr lang="de-DE" sz="2000" dirty="0" smtClean="0"/>
+                        <a:t> </a:t>
+                      </a:r>
+                      <a:r>
+                        <a:rPr lang="de-DE" sz="2000" dirty="0" err="1" smtClean="0"/>
+                        <a:t>under</a:t>
+                      </a:r>
+                      <a:r>
+                        <a:rPr lang="de-DE" sz="2000" dirty="0" smtClean="0"/>
+                        <a:t> 10 </a:t>
+                      </a:r>
+                      <a:r>
+                        <a:rPr lang="de-DE" sz="2000" dirty="0" err="1" smtClean="0"/>
+                        <a:t>secs</a:t>
+                      </a:r>
+                      <a:r>
+                        <a:rPr lang="de-DE" sz="2000" dirty="0" smtClean="0"/>
+                        <a:t> (</a:t>
+                      </a:r>
+                      <a:r>
+                        <a:rPr lang="de-DE" sz="2000" dirty="0" err="1" smtClean="0"/>
+                        <a:t>excluding</a:t>
+                      </a:r>
+                      <a:r>
+                        <a:rPr lang="de-DE" sz="2000" dirty="0" smtClean="0"/>
+                        <a:t> </a:t>
+                      </a:r>
+                      <a:r>
+                        <a:rPr lang="de-DE" sz="2000" dirty="0" err="1" smtClean="0"/>
+                        <a:t>gradle</a:t>
+                      </a:r>
+                      <a:r>
+                        <a:rPr lang="de-DE" sz="2000" dirty="0" smtClean="0"/>
+                        <a:t> </a:t>
+                      </a:r>
+                      <a:r>
+                        <a:rPr lang="de-DE" sz="2000" dirty="0" err="1" smtClean="0"/>
+                        <a:t>startup</a:t>
+                      </a:r>
+                      <a:r>
+                        <a:rPr lang="de-DE" sz="2000" dirty="0" smtClean="0"/>
+                        <a:t>)</a:t>
+                      </a:r>
+                      <a:endParaRPr lang="de-DE" sz="2000" dirty="0"/>
+                    </a:p>
+                  </a:txBody>
+                  <a:tcPr/>
+                </a:tc>
+              </a:tr>
+            </a:tbl>
+          </a:graphicData>
+        </a:graphic>
+      </p:graphicFrame>
+    </p:spTree>
+    <p:extLst>
+      <p:ext uri="{BB962C8B-B14F-4D97-AF65-F5344CB8AC3E}">
+        <p14:creationId xmlns:p14="http://schemas.microsoft.com/office/powerpoint/2010/main" val="772483709"/>
+      </p:ext>
+    </p:extLst>
+  </p:cSld>
+  <p:clrMapOvr>
+    <a:masterClrMapping/>
+  </p:clrMapOvr>
+  <p:timing>
+    <p:tnLst>
+      <p:par>
+        <p:cTn xmlns:p14="http://schemas.microsoft.com/office/powerpoint/2010/main" id="1" dur="indefinite" restart="never" nodeType="tmRoot"/>
+      </p:par>
+    </p:tnLst>
+  </p:timing>
+</p:sld>
+</file>
+
+<file path=ppt/slides/slide11.xml><?xml version="1.0" encoding="utf-8"?>
+<p:sld xmlns:a="http://schemas.openxmlformats.org/drawingml/2006/main" xmlns:r="http://schemas.openxmlformats.org/officeDocument/2006/relationships" xmlns:p="http://schemas.openxmlformats.org/presentationml/2006/main">
+  <p:cSld>
+    <p:spTree>
+      <p:nvGrpSpPr>
+        <p:cNvPr id="1" name=""/>
+        <p:cNvGrpSpPr/>
+        <p:nvPr/>
+      </p:nvGrpSpPr>
+      <p:grpSpPr>
+        <a:xfrm>
+          <a:off x="0" y="0"/>
+          <a:ext cx="0" cy="0"/>
+          <a:chOff x="0" y="0"/>
+          <a:chExt cx="0" cy="0"/>
+        </a:xfrm>
+      </p:grpSpPr>
+      <p:sp>
+        <p:nvSpPr>
+          <p:cNvPr id="2" name="Titel 1"/>
+          <p:cNvSpPr>
+            <a:spLocks noGrp="1"/>
+          </p:cNvSpPr>
+          <p:nvPr>
+            <p:ph type="title"/>
+          </p:nvPr>
+        </p:nvSpPr>
+        <p:spPr/>
+        <p:txBody>
+          <a:bodyPr/>
+          <a:lstStyle/>
+          <a:p>
+            <a:r>
+              <a:rPr lang="de-DE" dirty="0" err="1" smtClean="0"/>
               <a:t>Constraints</a:t>
             </a:r>
             <a:endParaRPr lang="de-DE" dirty="0"/>
@@ -2724,7 +3951,7 @@
 </p:sld>
 </file>
 
-<file path=ppt/slides/slide11.xml><?xml version="1.0" encoding="utf-8"?>
+<file path=ppt/slides/slide12.xml><?xml version="1.0" encoding="utf-8"?>
 <p:sld xmlns:a="http://schemas.openxmlformats.org/drawingml/2006/main" xmlns:r="http://schemas.openxmlformats.org/officeDocument/2006/relationships" xmlns:p="http://schemas.openxmlformats.org/presentationml/2006/main">
   <p:cSld>
     <p:spTree>
@@ -2818,7 +4045,7 @@
 </p:sld>
 </file>
 
-<file path=ppt/slides/slide12.xml><?xml version="1.0" encoding="utf-8"?>
+<file path=ppt/slides/slide13.xml><?xml version="1.0" encoding="utf-8"?>
 <p:sld xmlns:a="http://schemas.openxmlformats.org/drawingml/2006/main" xmlns:r="http://schemas.openxmlformats.org/officeDocument/2006/relationships" xmlns:p="http://schemas.openxmlformats.org/presentationml/2006/main">
   <p:cSld>
     <p:spTree>
@@ -2912,7 +4139,7 @@
 </p:sld>
 </file>
 
-<file path=ppt/slides/slide13.xml><?xml version="1.0" encoding="utf-8"?>
+<file path=ppt/slides/slide14.xml><?xml version="1.0" encoding="utf-8"?>
 <p:sld xmlns:a="http://schemas.openxmlformats.org/drawingml/2006/main" xmlns:r="http://schemas.openxmlformats.org/officeDocument/2006/relationships" xmlns:p="http://schemas.openxmlformats.org/presentationml/2006/main">
   <p:cSld>
     <p:spTree>
@@ -3180,7 +4407,7 @@
 </p:sld>
 </file>
 
-<file path=ppt/slides/slide14.xml><?xml version="1.0" encoding="utf-8"?>
+<file path=ppt/slides/slide15.xml><?xml version="1.0" encoding="utf-8"?>
 <p:sld xmlns:a="http://schemas.openxmlformats.org/drawingml/2006/main" xmlns:r="http://schemas.openxmlformats.org/officeDocument/2006/relationships" xmlns:p="http://schemas.openxmlformats.org/presentationml/2006/main">
   <p:cSld>
     <p:spTree>
@@ -3231,7 +4458,7 @@
       </p:sp>
       <p:pic>
         <p:nvPicPr>
-          <p:cNvPr id="3" name="Bild 2" descr="hsc-whitebox.png"/>
+          <p:cNvPr id="4" name="Bild 3" descr="hsc-whitebox.png"/>
           <p:cNvPicPr>
             <a:picLocks noChangeAspect="1"/>
           </p:cNvPicPr>
@@ -3251,7 +4478,7 @@
         </p:blipFill>
         <p:spPr>
           <a:xfrm>
-            <a:off x="226276" y="978680"/>
+            <a:off x="128291" y="1029992"/>
             <a:ext cx="8686800" cy="5828008"/>
           </a:xfrm>
           <a:prstGeom prst="rect">
@@ -3279,7 +4506,7 @@
 </p:sld>
 </file>
 
-<file path=ppt/slides/slide15.xml><?xml version="1.0" encoding="utf-8"?>
+<file path=ppt/slides/slide16.xml><?xml version="1.0" encoding="utf-8"?>
 <p:sld xmlns:a="http://schemas.openxmlformats.org/drawingml/2006/main" xmlns:r="http://schemas.openxmlformats.org/officeDocument/2006/relationships" xmlns:p="http://schemas.openxmlformats.org/presentationml/2006/main">
   <p:cSld>
     <p:spTree>
@@ -3378,7 +4605,7 @@
 </p:sld>
 </file>
 
-<file path=ppt/slides/slide16.xml><?xml version="1.0" encoding="utf-8"?>
+<file path=ppt/slides/slide17.xml><?xml version="1.0" encoding="utf-8"?>
 <p:sld xmlns:a="http://schemas.openxmlformats.org/drawingml/2006/main" xmlns:r="http://schemas.openxmlformats.org/officeDocument/2006/relationships" xmlns:p="http://schemas.openxmlformats.org/presentationml/2006/main">
   <p:cSld>
     <p:spTree>
@@ -3503,7 +4730,7 @@
 </p:sld>
 </file>
 
-<file path=ppt/slides/slide17.xml><?xml version="1.0" encoding="utf-8"?>
+<file path=ppt/slides/slide18.xml><?xml version="1.0" encoding="utf-8"?>
 <p:sld xmlns:a="http://schemas.openxmlformats.org/drawingml/2006/main" xmlns:r="http://schemas.openxmlformats.org/officeDocument/2006/relationships" xmlns:p="http://schemas.openxmlformats.org/presentationml/2006/main">
   <p:cSld>
     <p:spTree>
@@ -3749,7 +4976,7 @@
 </p:sld>
 </file>
 
-<file path=ppt/slides/slide18.xml><?xml version="1.0" encoding="utf-8"?>
+<file path=ppt/slides/slide19.xml><?xml version="1.0" encoding="utf-8"?>
 <p:sld xmlns:a="http://schemas.openxmlformats.org/drawingml/2006/main" xmlns:r="http://schemas.openxmlformats.org/officeDocument/2006/relationships" xmlns:p="http://schemas.openxmlformats.org/presentationml/2006/main">
   <p:cSld>
     <p:spTree>
@@ -3992,7 +5219,344 @@
 </p:sld>
 </file>
 
-<file path=ppt/slides/slide19.xml><?xml version="1.0" encoding="utf-8"?>
+<file path=ppt/slides/slide2.xml><?xml version="1.0" encoding="utf-8"?>
+<p:sld xmlns:a="http://schemas.openxmlformats.org/drawingml/2006/main" xmlns:r="http://schemas.openxmlformats.org/officeDocument/2006/relationships" xmlns:p="http://schemas.openxmlformats.org/presentationml/2006/main">
+  <p:cSld>
+    <p:spTree>
+      <p:nvGrpSpPr>
+        <p:cNvPr id="1" name=""/>
+        <p:cNvGrpSpPr/>
+        <p:nvPr/>
+      </p:nvGrpSpPr>
+      <p:grpSpPr>
+        <a:xfrm>
+          <a:off x="0" y="0"/>
+          <a:ext cx="0" cy="0"/>
+          <a:chOff x="0" y="0"/>
+          <a:chExt cx="0" cy="0"/>
+        </a:xfrm>
+      </p:grpSpPr>
+      <p:sp>
+        <p:nvSpPr>
+          <p:cNvPr id="2" name="Titel 1"/>
+          <p:cNvSpPr>
+            <a:spLocks noGrp="1"/>
+          </p:cNvSpPr>
+          <p:nvPr>
+            <p:ph type="title"/>
+          </p:nvPr>
+        </p:nvSpPr>
+        <p:spPr/>
+        <p:txBody>
+          <a:bodyPr/>
+          <a:lstStyle/>
+          <a:p>
+            <a:r>
+              <a:rPr lang="de-DE" dirty="0" err="1" smtClean="0"/>
+              <a:t>Prerequisites</a:t>
+            </a:r>
+            <a:endParaRPr lang="de-DE" dirty="0"/>
+          </a:p>
+        </p:txBody>
+      </p:sp>
+      <p:sp>
+        <p:nvSpPr>
+          <p:cNvPr id="4" name="Inhaltsplatzhalter 3"/>
+          <p:cNvSpPr>
+            <a:spLocks noGrp="1"/>
+          </p:cNvSpPr>
+          <p:nvPr>
+            <p:ph sz="half" idx="1"/>
+          </p:nvPr>
+        </p:nvSpPr>
+        <p:spPr/>
+        <p:txBody>
+          <a:bodyPr/>
+          <a:lstStyle/>
+          <a:p>
+            <a:pPr marL="0" indent="0">
+              <a:buNone/>
+            </a:pPr>
+            <a:r>
+              <a:rPr lang="de-DE" dirty="0" err="1" smtClean="0"/>
+              <a:t>To</a:t>
+            </a:r>
+            <a:r>
+              <a:rPr lang="de-DE" dirty="0" smtClean="0"/>
+              <a:t> </a:t>
+            </a:r>
+            <a:r>
+              <a:rPr lang="de-DE" dirty="0" err="1" smtClean="0"/>
+              <a:t>understand</a:t>
+            </a:r>
+            <a:r>
+              <a:rPr lang="de-DE" dirty="0" smtClean="0"/>
+              <a:t> </a:t>
+            </a:r>
+            <a:r>
+              <a:rPr lang="de-DE" dirty="0" err="1" smtClean="0"/>
+              <a:t>the</a:t>
+            </a:r>
+            <a:r>
+              <a:rPr lang="de-DE" dirty="0" smtClean="0"/>
+              <a:t> </a:t>
+            </a:r>
+            <a:r>
+              <a:rPr lang="de-DE" dirty="0" err="1" smtClean="0"/>
+              <a:t>project</a:t>
+            </a:r>
+            <a:r>
+              <a:rPr lang="de-DE" dirty="0" smtClean="0"/>
+              <a:t> &amp; </a:t>
+            </a:r>
+            <a:r>
+              <a:rPr lang="de-DE" dirty="0" err="1" smtClean="0"/>
+              <a:t>sourcecode</a:t>
+            </a:r>
+            <a:endParaRPr lang="de-DE" dirty="0" smtClean="0"/>
+          </a:p>
+          <a:p>
+            <a:pPr lvl="1"/>
+            <a:r>
+              <a:rPr lang="de-DE" dirty="0" smtClean="0"/>
+              <a:t>Basic </a:t>
+            </a:r>
+            <a:r>
+              <a:rPr lang="de-DE" dirty="0" err="1" smtClean="0"/>
+              <a:t>knowledge</a:t>
+            </a:r>
+            <a:r>
+              <a:rPr lang="de-DE" dirty="0" smtClean="0"/>
+              <a:t> </a:t>
+            </a:r>
+            <a:r>
+              <a:rPr lang="de-DE" dirty="0" err="1" smtClean="0"/>
+              <a:t>of</a:t>
+            </a:r>
+            <a:r>
+              <a:rPr lang="de-DE" dirty="0" smtClean="0"/>
+              <a:t> HTML (link, </a:t>
+            </a:r>
+            <a:r>
+              <a:rPr lang="de-DE" dirty="0" err="1" smtClean="0"/>
+              <a:t>anchor</a:t>
+            </a:r>
+            <a:r>
+              <a:rPr lang="de-DE" dirty="0" smtClean="0"/>
+              <a:t>, </a:t>
+            </a:r>
+            <a:r>
+              <a:rPr lang="de-DE" dirty="0" err="1" smtClean="0"/>
+              <a:t>id</a:t>
+            </a:r>
+            <a:r>
+              <a:rPr lang="de-DE" dirty="0" smtClean="0"/>
+              <a:t>, URI, </a:t>
+            </a:r>
+            <a:r>
+              <a:rPr lang="de-DE" dirty="0" err="1" smtClean="0"/>
+              <a:t>ImageMap</a:t>
+            </a:r>
+            <a:r>
+              <a:rPr lang="de-DE" dirty="0" smtClean="0"/>
+              <a:t>)</a:t>
+            </a:r>
+          </a:p>
+          <a:p>
+            <a:pPr lvl="1"/>
+            <a:r>
+              <a:rPr lang="de-DE" dirty="0" smtClean="0"/>
+              <a:t>Basic </a:t>
+            </a:r>
+            <a:r>
+              <a:rPr lang="de-DE" dirty="0" err="1" smtClean="0"/>
+              <a:t>knowledge</a:t>
+            </a:r>
+            <a:r>
+              <a:rPr lang="de-DE" dirty="0" smtClean="0"/>
+              <a:t> </a:t>
+            </a:r>
+            <a:r>
+              <a:rPr lang="de-DE" dirty="0" err="1" smtClean="0"/>
+              <a:t>of</a:t>
+            </a:r>
+            <a:r>
+              <a:rPr lang="de-DE" dirty="0" smtClean="0"/>
+              <a:t> Groovy + </a:t>
+            </a:r>
+            <a:r>
+              <a:rPr lang="de-DE" dirty="0" err="1" smtClean="0"/>
+              <a:t>Gradle</a:t>
+            </a:r>
+            <a:endParaRPr lang="de-DE" dirty="0"/>
+          </a:p>
+        </p:txBody>
+      </p:sp>
+      <p:sp>
+        <p:nvSpPr>
+          <p:cNvPr id="5" name="Inhaltsplatzhalter 4"/>
+          <p:cNvSpPr>
+            <a:spLocks noGrp="1"/>
+          </p:cNvSpPr>
+          <p:nvPr>
+            <p:ph sz="half" idx="2"/>
+          </p:nvPr>
+        </p:nvSpPr>
+        <p:spPr>
+          <a:xfrm>
+            <a:off x="4988618" y="1600201"/>
+            <a:ext cx="4038600" cy="2236352"/>
+          </a:xfrm>
+        </p:spPr>
+        <p:txBody>
+          <a:bodyPr/>
+          <a:lstStyle/>
+          <a:p>
+            <a:pPr marL="0" indent="0">
+              <a:buNone/>
+            </a:pPr>
+            <a:r>
+              <a:rPr lang="de-DE" dirty="0" err="1" smtClean="0"/>
+              <a:t>Disclaimer</a:t>
+            </a:r>
+            <a:r>
+              <a:rPr lang="de-DE" dirty="0" smtClean="0"/>
+              <a:t>:</a:t>
+            </a:r>
+          </a:p>
+          <a:p>
+            <a:pPr lvl="1"/>
+            <a:r>
+              <a:rPr lang="de-DE" dirty="0" smtClean="0"/>
+              <a:t>This </a:t>
+            </a:r>
+            <a:r>
+              <a:rPr lang="de-DE" dirty="0" err="1" smtClean="0"/>
+              <a:t>project</a:t>
+            </a:r>
+            <a:r>
+              <a:rPr lang="de-DE" dirty="0" smtClean="0"/>
+              <a:t> </a:t>
+            </a:r>
+            <a:r>
+              <a:rPr lang="de-DE" dirty="0" err="1" smtClean="0"/>
+              <a:t>seriously</a:t>
+            </a:r>
+            <a:r>
+              <a:rPr lang="de-DE" dirty="0" smtClean="0"/>
+              <a:t> </a:t>
+            </a:r>
+            <a:r>
+              <a:rPr lang="de-DE" dirty="0" err="1" smtClean="0"/>
+              <a:t>over-documented</a:t>
+            </a:r>
+            <a:endParaRPr lang="de-DE" dirty="0" smtClean="0"/>
+          </a:p>
+          <a:p>
+            <a:pPr lvl="1"/>
+            <a:endParaRPr lang="de-DE" dirty="0"/>
+          </a:p>
+          <a:p>
+            <a:pPr lvl="1"/>
+            <a:r>
+              <a:rPr lang="de-DE" dirty="0" smtClean="0"/>
+              <a:t>Code </a:t>
+            </a:r>
+            <a:r>
+              <a:rPr lang="de-DE" dirty="0" err="1" smtClean="0"/>
+              <a:t>is</a:t>
+            </a:r>
+            <a:r>
+              <a:rPr lang="de-DE" dirty="0" smtClean="0"/>
+              <a:t> </a:t>
+            </a:r>
+            <a:r>
+              <a:rPr lang="de-DE" dirty="0" err="1" smtClean="0"/>
+              <a:t>unfinished</a:t>
+            </a:r>
+            <a:r>
+              <a:rPr lang="de-DE" dirty="0" smtClean="0"/>
+              <a:t> </a:t>
+            </a:r>
+            <a:r>
+              <a:rPr lang="de-DE" dirty="0" smtClean="0">
+                <a:sym typeface="Wingdings"/>
+              </a:rPr>
+              <a:t></a:t>
+            </a:r>
+            <a:endParaRPr lang="de-DE" dirty="0" smtClean="0"/>
+          </a:p>
+          <a:p>
+            <a:pPr marL="457200" lvl="1" indent="0">
+              <a:buNone/>
+            </a:pPr>
+            <a:endParaRPr lang="de-DE" dirty="0"/>
+          </a:p>
+        </p:txBody>
+      </p:sp>
+      <p:sp>
+        <p:nvSpPr>
+          <p:cNvPr id="6" name="Textfeld 5"/>
+          <p:cNvSpPr txBox="1"/>
+          <p:nvPr/>
+        </p:nvSpPr>
+        <p:spPr>
+          <a:xfrm>
+            <a:off x="2345211" y="6126163"/>
+            <a:ext cx="4301177" cy="369332"/>
+          </a:xfrm>
+          <a:prstGeom prst="rect">
+            <a:avLst/>
+          </a:prstGeom>
+          <a:noFill/>
+        </p:spPr>
+        <p:txBody>
+          <a:bodyPr wrap="none" rtlCol="0">
+            <a:spAutoFit/>
+          </a:bodyPr>
+          <a:lstStyle/>
+          <a:p>
+            <a:r>
+              <a:rPr lang="de-DE" dirty="0" smtClean="0"/>
+              <a:t>https://</a:t>
+            </a:r>
+            <a:r>
+              <a:rPr lang="de-DE" dirty="0" err="1" smtClean="0"/>
+              <a:t>github.com</a:t>
+            </a:r>
+            <a:r>
+              <a:rPr lang="de-DE" dirty="0" smtClean="0"/>
+              <a:t>/aim42/</a:t>
+            </a:r>
+            <a:r>
+              <a:rPr lang="de-DE" dirty="0" err="1" smtClean="0"/>
+              <a:t>htmlSanityCheck</a:t>
+            </a:r>
+            <a:endParaRPr lang="de-DE" dirty="0"/>
+          </a:p>
+        </p:txBody>
+      </p:sp>
+    </p:spTree>
+    <p:extLst>
+      <p:ext uri="{BB962C8B-B14F-4D97-AF65-F5344CB8AC3E}">
+        <p14:creationId xmlns:p14="http://schemas.microsoft.com/office/powerpoint/2010/main" val="2848215274"/>
+      </p:ext>
+    </p:extLst>
+  </p:cSld>
+  <p:clrMapOvr>
+    <a:masterClrMapping/>
+  </p:clrMapOvr>
+  <p:timing>
+    <p:tnLst>
+      <p:par>
+        <p:cTn xmlns:p14="http://schemas.microsoft.com/office/powerpoint/2010/main" id="1" dur="indefinite" restart="never" nodeType="tmRoot"/>
+      </p:par>
+    </p:tnLst>
+  </p:timing>
+</p:sld>
+</file>
+
+<file path=ppt/slides/slide20.xml><?xml version="1.0" encoding="utf-8"?>
 <p:sld xmlns:a="http://schemas.openxmlformats.org/drawingml/2006/main" xmlns:r="http://schemas.openxmlformats.org/officeDocument/2006/relationships" xmlns:p="http://schemas.openxmlformats.org/presentationml/2006/main">
   <p:cSld>
     <p:spTree>
@@ -4452,344 +6016,7 @@
 </p:sld>
 </file>
 
-<file path=ppt/slides/slide2.xml><?xml version="1.0" encoding="utf-8"?>
-<p:sld xmlns:a="http://schemas.openxmlformats.org/drawingml/2006/main" xmlns:r="http://schemas.openxmlformats.org/officeDocument/2006/relationships" xmlns:p="http://schemas.openxmlformats.org/presentationml/2006/main">
-  <p:cSld>
-    <p:spTree>
-      <p:nvGrpSpPr>
-        <p:cNvPr id="1" name=""/>
-        <p:cNvGrpSpPr/>
-        <p:nvPr/>
-      </p:nvGrpSpPr>
-      <p:grpSpPr>
-        <a:xfrm>
-          <a:off x="0" y="0"/>
-          <a:ext cx="0" cy="0"/>
-          <a:chOff x="0" y="0"/>
-          <a:chExt cx="0" cy="0"/>
-        </a:xfrm>
-      </p:grpSpPr>
-      <p:sp>
-        <p:nvSpPr>
-          <p:cNvPr id="2" name="Titel 1"/>
-          <p:cNvSpPr>
-            <a:spLocks noGrp="1"/>
-          </p:cNvSpPr>
-          <p:nvPr>
-            <p:ph type="title"/>
-          </p:nvPr>
-        </p:nvSpPr>
-        <p:spPr/>
-        <p:txBody>
-          <a:bodyPr/>
-          <a:lstStyle/>
-          <a:p>
-            <a:r>
-              <a:rPr lang="de-DE" dirty="0" err="1" smtClean="0"/>
-              <a:t>Prerequisites</a:t>
-            </a:r>
-            <a:endParaRPr lang="de-DE" dirty="0"/>
-          </a:p>
-        </p:txBody>
-      </p:sp>
-      <p:sp>
-        <p:nvSpPr>
-          <p:cNvPr id="4" name="Inhaltsplatzhalter 3"/>
-          <p:cNvSpPr>
-            <a:spLocks noGrp="1"/>
-          </p:cNvSpPr>
-          <p:nvPr>
-            <p:ph sz="half" idx="1"/>
-          </p:nvPr>
-        </p:nvSpPr>
-        <p:spPr/>
-        <p:txBody>
-          <a:bodyPr/>
-          <a:lstStyle/>
-          <a:p>
-            <a:pPr marL="0" indent="0">
-              <a:buNone/>
-            </a:pPr>
-            <a:r>
-              <a:rPr lang="de-DE" dirty="0" err="1" smtClean="0"/>
-              <a:t>To</a:t>
-            </a:r>
-            <a:r>
-              <a:rPr lang="de-DE" dirty="0" smtClean="0"/>
-              <a:t> </a:t>
-            </a:r>
-            <a:r>
-              <a:rPr lang="de-DE" dirty="0" err="1" smtClean="0"/>
-              <a:t>understand</a:t>
-            </a:r>
-            <a:r>
-              <a:rPr lang="de-DE" dirty="0" smtClean="0"/>
-              <a:t> </a:t>
-            </a:r>
-            <a:r>
-              <a:rPr lang="de-DE" dirty="0" err="1" smtClean="0"/>
-              <a:t>the</a:t>
-            </a:r>
-            <a:r>
-              <a:rPr lang="de-DE" dirty="0" smtClean="0"/>
-              <a:t> </a:t>
-            </a:r>
-            <a:r>
-              <a:rPr lang="de-DE" dirty="0" err="1" smtClean="0"/>
-              <a:t>project</a:t>
-            </a:r>
-            <a:r>
-              <a:rPr lang="de-DE" dirty="0" smtClean="0"/>
-              <a:t> &amp; </a:t>
-            </a:r>
-            <a:r>
-              <a:rPr lang="de-DE" dirty="0" err="1" smtClean="0"/>
-              <a:t>sourcecode</a:t>
-            </a:r>
-            <a:endParaRPr lang="de-DE" dirty="0" smtClean="0"/>
-          </a:p>
-          <a:p>
-            <a:pPr lvl="1"/>
-            <a:r>
-              <a:rPr lang="de-DE" dirty="0" smtClean="0"/>
-              <a:t>Basic </a:t>
-            </a:r>
-            <a:r>
-              <a:rPr lang="de-DE" dirty="0" err="1" smtClean="0"/>
-              <a:t>knowledge</a:t>
-            </a:r>
-            <a:r>
-              <a:rPr lang="de-DE" dirty="0" smtClean="0"/>
-              <a:t> </a:t>
-            </a:r>
-            <a:r>
-              <a:rPr lang="de-DE" dirty="0" err="1" smtClean="0"/>
-              <a:t>of</a:t>
-            </a:r>
-            <a:r>
-              <a:rPr lang="de-DE" dirty="0" smtClean="0"/>
-              <a:t> HTML (link, </a:t>
-            </a:r>
-            <a:r>
-              <a:rPr lang="de-DE" dirty="0" err="1" smtClean="0"/>
-              <a:t>anchor</a:t>
-            </a:r>
-            <a:r>
-              <a:rPr lang="de-DE" dirty="0" smtClean="0"/>
-              <a:t>, </a:t>
-            </a:r>
-            <a:r>
-              <a:rPr lang="de-DE" dirty="0" err="1" smtClean="0"/>
-              <a:t>id</a:t>
-            </a:r>
-            <a:r>
-              <a:rPr lang="de-DE" dirty="0" smtClean="0"/>
-              <a:t>, URI, </a:t>
-            </a:r>
-            <a:r>
-              <a:rPr lang="de-DE" dirty="0" err="1" smtClean="0"/>
-              <a:t>ImageMap</a:t>
-            </a:r>
-            <a:r>
-              <a:rPr lang="de-DE" dirty="0" smtClean="0"/>
-              <a:t>)</a:t>
-            </a:r>
-          </a:p>
-          <a:p>
-            <a:pPr lvl="1"/>
-            <a:r>
-              <a:rPr lang="de-DE" dirty="0" smtClean="0"/>
-              <a:t>Basic </a:t>
-            </a:r>
-            <a:r>
-              <a:rPr lang="de-DE" dirty="0" err="1" smtClean="0"/>
-              <a:t>knowledge</a:t>
-            </a:r>
-            <a:r>
-              <a:rPr lang="de-DE" dirty="0" smtClean="0"/>
-              <a:t> </a:t>
-            </a:r>
-            <a:r>
-              <a:rPr lang="de-DE" dirty="0" err="1" smtClean="0"/>
-              <a:t>of</a:t>
-            </a:r>
-            <a:r>
-              <a:rPr lang="de-DE" dirty="0" smtClean="0"/>
-              <a:t> Groovy + </a:t>
-            </a:r>
-            <a:r>
-              <a:rPr lang="de-DE" dirty="0" err="1" smtClean="0"/>
-              <a:t>Gradle</a:t>
-            </a:r>
-            <a:endParaRPr lang="de-DE" dirty="0"/>
-          </a:p>
-        </p:txBody>
-      </p:sp>
-      <p:sp>
-        <p:nvSpPr>
-          <p:cNvPr id="5" name="Inhaltsplatzhalter 4"/>
-          <p:cNvSpPr>
-            <a:spLocks noGrp="1"/>
-          </p:cNvSpPr>
-          <p:nvPr>
-            <p:ph sz="half" idx="2"/>
-          </p:nvPr>
-        </p:nvSpPr>
-        <p:spPr>
-          <a:xfrm>
-            <a:off x="4988618" y="1600201"/>
-            <a:ext cx="4038600" cy="2236352"/>
-          </a:xfrm>
-        </p:spPr>
-        <p:txBody>
-          <a:bodyPr/>
-          <a:lstStyle/>
-          <a:p>
-            <a:pPr marL="0" indent="0">
-              <a:buNone/>
-            </a:pPr>
-            <a:r>
-              <a:rPr lang="de-DE" dirty="0" err="1" smtClean="0"/>
-              <a:t>Disclaimer</a:t>
-            </a:r>
-            <a:r>
-              <a:rPr lang="de-DE" dirty="0" smtClean="0"/>
-              <a:t>:</a:t>
-            </a:r>
-          </a:p>
-          <a:p>
-            <a:pPr lvl="1"/>
-            <a:r>
-              <a:rPr lang="de-DE" dirty="0" smtClean="0"/>
-              <a:t>This </a:t>
-            </a:r>
-            <a:r>
-              <a:rPr lang="de-DE" dirty="0" err="1" smtClean="0"/>
-              <a:t>project</a:t>
-            </a:r>
-            <a:r>
-              <a:rPr lang="de-DE" dirty="0" smtClean="0"/>
-              <a:t> </a:t>
-            </a:r>
-            <a:r>
-              <a:rPr lang="de-DE" dirty="0" err="1" smtClean="0"/>
-              <a:t>seriously</a:t>
-            </a:r>
-            <a:r>
-              <a:rPr lang="de-DE" dirty="0" smtClean="0"/>
-              <a:t> </a:t>
-            </a:r>
-            <a:r>
-              <a:rPr lang="de-DE" dirty="0" err="1" smtClean="0"/>
-              <a:t>over-documented</a:t>
-            </a:r>
-            <a:endParaRPr lang="de-DE" dirty="0" smtClean="0"/>
-          </a:p>
-          <a:p>
-            <a:pPr lvl="1"/>
-            <a:endParaRPr lang="de-DE" dirty="0"/>
-          </a:p>
-          <a:p>
-            <a:pPr lvl="1"/>
-            <a:r>
-              <a:rPr lang="de-DE" dirty="0" smtClean="0"/>
-              <a:t>Code </a:t>
-            </a:r>
-            <a:r>
-              <a:rPr lang="de-DE" dirty="0" err="1" smtClean="0"/>
-              <a:t>is</a:t>
-            </a:r>
-            <a:r>
-              <a:rPr lang="de-DE" dirty="0" smtClean="0"/>
-              <a:t> </a:t>
-            </a:r>
-            <a:r>
-              <a:rPr lang="de-DE" dirty="0" err="1" smtClean="0"/>
-              <a:t>unfinished</a:t>
-            </a:r>
-            <a:r>
-              <a:rPr lang="de-DE" dirty="0" smtClean="0"/>
-              <a:t> </a:t>
-            </a:r>
-            <a:r>
-              <a:rPr lang="de-DE" dirty="0" smtClean="0">
-                <a:sym typeface="Wingdings"/>
-              </a:rPr>
-              <a:t></a:t>
-            </a:r>
-            <a:endParaRPr lang="de-DE" dirty="0" smtClean="0"/>
-          </a:p>
-          <a:p>
-            <a:pPr marL="457200" lvl="1" indent="0">
-              <a:buNone/>
-            </a:pPr>
-            <a:endParaRPr lang="de-DE" dirty="0"/>
-          </a:p>
-        </p:txBody>
-      </p:sp>
-      <p:sp>
-        <p:nvSpPr>
-          <p:cNvPr id="6" name="Textfeld 5"/>
-          <p:cNvSpPr txBox="1"/>
-          <p:nvPr/>
-        </p:nvSpPr>
-        <p:spPr>
-          <a:xfrm>
-            <a:off x="2345211" y="6126163"/>
-            <a:ext cx="4301177" cy="369332"/>
-          </a:xfrm>
-          <a:prstGeom prst="rect">
-            <a:avLst/>
-          </a:prstGeom>
-          <a:noFill/>
-        </p:spPr>
-        <p:txBody>
-          <a:bodyPr wrap="none" rtlCol="0">
-            <a:spAutoFit/>
-          </a:bodyPr>
-          <a:lstStyle/>
-          <a:p>
-            <a:r>
-              <a:rPr lang="de-DE" dirty="0" smtClean="0"/>
-              <a:t>https://</a:t>
-            </a:r>
-            <a:r>
-              <a:rPr lang="de-DE" dirty="0" err="1" smtClean="0"/>
-              <a:t>github.com</a:t>
-            </a:r>
-            <a:r>
-              <a:rPr lang="de-DE" dirty="0" smtClean="0"/>
-              <a:t>/aim42/</a:t>
-            </a:r>
-            <a:r>
-              <a:rPr lang="de-DE" dirty="0" err="1" smtClean="0"/>
-              <a:t>htmlSanityCheck</a:t>
-            </a:r>
-            <a:endParaRPr lang="de-DE" dirty="0"/>
-          </a:p>
-        </p:txBody>
-      </p:sp>
-    </p:spTree>
-    <p:extLst>
-      <p:ext uri="{BB962C8B-B14F-4D97-AF65-F5344CB8AC3E}">
-        <p14:creationId xmlns:p14="http://schemas.microsoft.com/office/powerpoint/2010/main" val="2848215274"/>
-      </p:ext>
-    </p:extLst>
-  </p:cSld>
-  <p:clrMapOvr>
-    <a:masterClrMapping/>
-  </p:clrMapOvr>
-  <p:timing>
-    <p:tnLst>
-      <p:par>
-        <p:cTn xmlns:p14="http://schemas.microsoft.com/office/powerpoint/2010/main" id="1" dur="indefinite" restart="never" nodeType="tmRoot"/>
-      </p:par>
-    </p:tnLst>
-  </p:timing>
-</p:sld>
-</file>
-
-<file path=ppt/slides/slide20.xml><?xml version="1.0" encoding="utf-8"?>
+<file path=ppt/slides/slide21.xml><?xml version="1.0" encoding="utf-8"?>
 <p:sld xmlns:a="http://schemas.openxmlformats.org/drawingml/2006/main" xmlns:r="http://schemas.openxmlformats.org/officeDocument/2006/relationships" xmlns:p="http://schemas.openxmlformats.org/presentationml/2006/main">
   <p:cSld>
     <p:spTree>
@@ -4898,7 +6125,7 @@
 </p:sld>
 </file>
 
-<file path=ppt/slides/slide21.xml><?xml version="1.0" encoding="utf-8"?>
+<file path=ppt/slides/slide22.xml><?xml version="1.0" encoding="utf-8"?>
 <p:sld xmlns:a="http://schemas.openxmlformats.org/drawingml/2006/main" xmlns:r="http://schemas.openxmlformats.org/officeDocument/2006/relationships" xmlns:p="http://schemas.openxmlformats.org/presentationml/2006/main">
   <p:cSld>
     <p:spTree>
@@ -4988,7 +6215,7 @@
 </p:sld>
 </file>
 
-<file path=ppt/slides/slide22.xml><?xml version="1.0" encoding="utf-8"?>
+<file path=ppt/slides/slide23.xml><?xml version="1.0" encoding="utf-8"?>
 <p:sld xmlns:a="http://schemas.openxmlformats.org/drawingml/2006/main" xmlns:r="http://schemas.openxmlformats.org/officeDocument/2006/relationships" xmlns:p="http://schemas.openxmlformats.org/presentationml/2006/main">
   <p:cSld>
     <p:spTree>
@@ -5089,7 +6316,7 @@
 </p:sld>
 </file>
 
-<file path=ppt/slides/slide23.xml><?xml version="1.0" encoding="utf-8"?>
+<file path=ppt/slides/slide24.xml><?xml version="1.0" encoding="utf-8"?>
 <p:sld xmlns:a="http://schemas.openxmlformats.org/drawingml/2006/main" xmlns:r="http://schemas.openxmlformats.org/officeDocument/2006/relationships" xmlns:p="http://schemas.openxmlformats.org/presentationml/2006/main">
   <p:cSld>
     <p:spTree>
@@ -5826,451 +7053,6 @@
     <p:extLst>
       <p:ext uri="{BB962C8B-B14F-4D97-AF65-F5344CB8AC3E}">
         <p14:creationId xmlns:p14="http://schemas.microsoft.com/office/powerpoint/2010/main" val="1698397647"/>
-      </p:ext>
-    </p:extLst>
-  </p:cSld>
-  <p:clrMapOvr>
-    <a:masterClrMapping/>
-  </p:clrMapOvr>
-  <p:timing>
-    <p:tnLst>
-      <p:par>
-        <p:cTn xmlns:p14="http://schemas.microsoft.com/office/powerpoint/2010/main" id="1" dur="indefinite" restart="never" nodeType="tmRoot"/>
-      </p:par>
-    </p:tnLst>
-  </p:timing>
-</p:sld>
-</file>
-
-<file path=ppt/slides/slide24.xml><?xml version="1.0" encoding="utf-8"?>
-<p:sld xmlns:a="http://schemas.openxmlformats.org/drawingml/2006/main" xmlns:r="http://schemas.openxmlformats.org/officeDocument/2006/relationships" xmlns:p="http://schemas.openxmlformats.org/presentationml/2006/main">
-  <p:cSld>
-    <p:spTree>
-      <p:nvGrpSpPr>
-        <p:cNvPr id="1" name=""/>
-        <p:cNvGrpSpPr/>
-        <p:nvPr/>
-      </p:nvGrpSpPr>
-      <p:grpSpPr>
-        <a:xfrm>
-          <a:off x="0" y="0"/>
-          <a:ext cx="0" cy="0"/>
-          <a:chOff x="0" y="0"/>
-          <a:chExt cx="0" cy="0"/>
-        </a:xfrm>
-      </p:grpSpPr>
-      <p:sp>
-        <p:nvSpPr>
-          <p:cNvPr id="2" name="Titel 1"/>
-          <p:cNvSpPr>
-            <a:spLocks noGrp="1"/>
-          </p:cNvSpPr>
-          <p:nvPr>
-            <p:ph type="title"/>
-          </p:nvPr>
-        </p:nvSpPr>
-        <p:spPr/>
-        <p:txBody>
-          <a:bodyPr/>
-          <a:lstStyle/>
-          <a:p>
-            <a:r>
-              <a:rPr lang="de-DE" dirty="0" err="1" smtClean="0"/>
-              <a:t>Decisions</a:t>
-            </a:r>
-            <a:endParaRPr lang="de-DE" dirty="0"/>
-          </a:p>
-        </p:txBody>
-      </p:sp>
-      <p:sp>
-        <p:nvSpPr>
-          <p:cNvPr id="3" name="Inhaltsplatzhalter 2"/>
-          <p:cNvSpPr>
-            <a:spLocks noGrp="1"/>
-          </p:cNvSpPr>
-          <p:nvPr>
-            <p:ph idx="1"/>
-          </p:nvPr>
-        </p:nvSpPr>
-        <p:spPr>
-          <a:xfrm>
-            <a:off x="431540" y="5126276"/>
-            <a:ext cx="8229600" cy="990992"/>
-          </a:xfrm>
-        </p:spPr>
-        <p:txBody>
-          <a:bodyPr/>
-          <a:lstStyle/>
-          <a:p>
-            <a:r>
-              <a:rPr lang="de-DE" dirty="0" err="1" smtClean="0"/>
-              <a:t>Result</a:t>
-            </a:r>
-            <a:r>
-              <a:rPr lang="de-DE" dirty="0" smtClean="0"/>
-              <a:t>: </a:t>
-            </a:r>
-            <a:r>
-              <a:rPr lang="de-DE" dirty="0" err="1" smtClean="0"/>
-              <a:t>Jsoup</a:t>
-            </a:r>
-            <a:r>
-              <a:rPr lang="de-DE" dirty="0" smtClean="0"/>
-              <a:t> </a:t>
-            </a:r>
-            <a:r>
-              <a:rPr lang="de-DE" dirty="0" err="1" smtClean="0"/>
-              <a:t>as</a:t>
-            </a:r>
-            <a:r>
-              <a:rPr lang="de-DE" dirty="0" smtClean="0"/>
-              <a:t> HTML </a:t>
-            </a:r>
-            <a:r>
-              <a:rPr lang="de-DE" dirty="0" err="1" smtClean="0"/>
-              <a:t>parser</a:t>
-            </a:r>
-            <a:r>
-              <a:rPr lang="de-DE" dirty="0" smtClean="0"/>
-              <a:t> </a:t>
-            </a:r>
-            <a:r>
-              <a:rPr lang="de-DE" sz="2400" dirty="0" smtClean="0"/>
-              <a:t>(http://</a:t>
-            </a:r>
-            <a:r>
-              <a:rPr lang="de-DE" sz="2400" dirty="0" err="1" smtClean="0"/>
-              <a:t>jsoup.org</a:t>
-            </a:r>
-            <a:r>
-              <a:rPr lang="de-DE" sz="2400" dirty="0" smtClean="0"/>
-              <a:t>)</a:t>
-            </a:r>
-            <a:endParaRPr lang="de-DE" dirty="0" smtClean="0"/>
-          </a:p>
-        </p:txBody>
-      </p:sp>
-      <p:graphicFrame>
-        <p:nvGraphicFramePr>
-          <p:cNvPr id="4" name="Tabelle 3"/>
-          <p:cNvGraphicFramePr>
-            <a:graphicFrameLocks noGrp="1"/>
-          </p:cNvGraphicFramePr>
-          <p:nvPr>
-            <p:extLst>
-              <p:ext uri="{D42A27DB-BD31-4B8C-83A1-F6EECF244321}">
-                <p14:modId xmlns:p14="http://schemas.microsoft.com/office/powerpoint/2010/main" val="1304009508"/>
-              </p:ext>
-            </p:extLst>
-          </p:nvPr>
-        </p:nvGraphicFramePr>
-        <p:xfrm>
-          <a:off x="431540" y="1589096"/>
-          <a:ext cx="7971573" cy="3017519"/>
-        </p:xfrm>
-        <a:graphic>
-          <a:graphicData uri="http://schemas.openxmlformats.org/drawingml/2006/table">
-            <a:tbl>
-              <a:tblPr firstRow="1" bandRow="1">
-                <a:tableStyleId>{5C22544A-7EE6-4342-B048-85BDC9FD1C3A}</a:tableStyleId>
-              </a:tblPr>
-              <a:tblGrid>
-                <a:gridCol w="3750774"/>
-                <a:gridCol w="1847402"/>
-                <a:gridCol w="2373397"/>
-              </a:tblGrid>
-              <a:tr h="370840">
-                <a:tc>
-                  <a:txBody>
-                    <a:bodyPr/>
-                    <a:lstStyle/>
-                    <a:p>
-                      <a:r>
-                        <a:rPr lang="de-DE" sz="2800" dirty="0" err="1" smtClean="0"/>
-                        <a:t>Criteria</a:t>
-                      </a:r>
-                      <a:endParaRPr lang="de-DE" sz="2800" dirty="0"/>
-                    </a:p>
-                  </a:txBody>
-                  <a:tcPr/>
-                </a:tc>
-                <a:tc>
-                  <a:txBody>
-                    <a:bodyPr/>
-                    <a:lstStyle/>
-                    <a:p>
-                      <a:r>
-                        <a:rPr lang="de-DE" sz="2800" dirty="0" smtClean="0"/>
-                        <a:t>A1:</a:t>
-                      </a:r>
-                      <a:r>
-                        <a:rPr lang="de-DE" sz="2800" baseline="0" dirty="0" smtClean="0"/>
-                        <a:t> </a:t>
-                      </a:r>
-                      <a:r>
-                        <a:rPr lang="de-DE" sz="2800" baseline="0" dirty="0" err="1" smtClean="0"/>
-                        <a:t>Jsoup</a:t>
-                      </a:r>
-                      <a:endParaRPr lang="de-DE" sz="2800" dirty="0"/>
-                    </a:p>
-                  </a:txBody>
-                  <a:tcPr/>
-                </a:tc>
-                <a:tc>
-                  <a:txBody>
-                    <a:bodyPr/>
-                    <a:lstStyle/>
-                    <a:p>
-                      <a:r>
-                        <a:rPr lang="de-DE" sz="2800" dirty="0" smtClean="0"/>
-                        <a:t>A2: </a:t>
-                      </a:r>
-                      <a:r>
-                        <a:rPr lang="de-DE" sz="2800" dirty="0" err="1" smtClean="0"/>
-                        <a:t>HTMLUnit</a:t>
-                      </a:r>
-                      <a:endParaRPr lang="de-DE" sz="2800" dirty="0"/>
-                    </a:p>
-                  </a:txBody>
-                  <a:tcPr/>
-                </a:tc>
-              </a:tr>
-              <a:tr h="370840">
-                <a:tc>
-                  <a:txBody>
-                    <a:bodyPr/>
-                    <a:lstStyle/>
-                    <a:p>
-                      <a:r>
-                        <a:rPr lang="de-DE" sz="2800" dirty="0" err="1" smtClean="0"/>
-                        <a:t>No</a:t>
-                      </a:r>
-                      <a:r>
-                        <a:rPr lang="de-DE" sz="2800" dirty="0" smtClean="0"/>
-                        <a:t> (!) </a:t>
-                      </a:r>
-                      <a:r>
-                        <a:rPr lang="de-DE" sz="2800" dirty="0" err="1" smtClean="0"/>
-                        <a:t>external</a:t>
-                      </a:r>
-                      <a:r>
-                        <a:rPr lang="de-DE" sz="2800" dirty="0" smtClean="0"/>
-                        <a:t> </a:t>
-                      </a:r>
-                      <a:r>
-                        <a:rPr lang="de-DE" sz="2800" dirty="0" err="1" smtClean="0"/>
-                        <a:t>dependencies</a:t>
-                      </a:r>
-                      <a:endParaRPr lang="de-DE" sz="2800" dirty="0"/>
-                    </a:p>
-                  </a:txBody>
-                  <a:tcPr/>
-                </a:tc>
-                <a:tc>
-                  <a:txBody>
-                    <a:bodyPr/>
-                    <a:lstStyle/>
-                    <a:p>
-                      <a:r>
-                        <a:rPr lang="de-DE" sz="2800" dirty="0" err="1" smtClean="0"/>
-                        <a:t>No</a:t>
-                      </a:r>
-                      <a:r>
-                        <a:rPr lang="de-DE" sz="2800" dirty="0" smtClean="0"/>
-                        <a:t> </a:t>
-                      </a:r>
-                      <a:r>
-                        <a:rPr lang="de-DE" sz="2800" dirty="0" err="1" smtClean="0"/>
-                        <a:t>deps</a:t>
-                      </a:r>
-                      <a:endParaRPr lang="de-DE" sz="2800" dirty="0"/>
-                    </a:p>
-                  </a:txBody>
-                  <a:tcPr/>
-                </a:tc>
-                <a:tc>
-                  <a:txBody>
-                    <a:bodyPr/>
-                    <a:lstStyle/>
-                    <a:p>
-                      <a:r>
-                        <a:rPr lang="de-DE" sz="2800" dirty="0" smtClean="0"/>
-                        <a:t>&gt;15 </a:t>
-                      </a:r>
-                      <a:r>
-                        <a:rPr lang="de-DE" sz="2800" dirty="0" err="1" smtClean="0"/>
-                        <a:t>deps</a:t>
-                      </a:r>
-                      <a:endParaRPr lang="de-DE" sz="2800" dirty="0"/>
-                    </a:p>
-                  </a:txBody>
-                  <a:tcPr/>
-                </a:tc>
-              </a:tr>
-              <a:tr h="370840">
-                <a:tc>
-                  <a:txBody>
-                    <a:bodyPr/>
-                    <a:lstStyle/>
-                    <a:p>
-                      <a:r>
-                        <a:rPr lang="de-DE" sz="2800" dirty="0" smtClean="0"/>
-                        <a:t>Simple API</a:t>
-                      </a:r>
-                      <a:endParaRPr lang="de-DE" sz="2800" dirty="0"/>
-                    </a:p>
-                  </a:txBody>
-                  <a:tcPr/>
-                </a:tc>
-                <a:tc>
-                  <a:txBody>
-                    <a:bodyPr/>
-                    <a:lstStyle/>
-                    <a:p>
-                      <a:r>
-                        <a:rPr lang="de-DE" sz="2800" dirty="0" smtClean="0"/>
-                        <a:t>simple</a:t>
-                      </a:r>
-                      <a:endParaRPr lang="de-DE" sz="2800" dirty="0"/>
-                    </a:p>
-                  </a:txBody>
-                  <a:tcPr/>
-                </a:tc>
-                <a:tc>
-                  <a:txBody>
-                    <a:bodyPr/>
-                    <a:lstStyle/>
-                    <a:p>
-                      <a:r>
-                        <a:rPr lang="de-DE" sz="2800" dirty="0" smtClean="0"/>
-                        <a:t>simple</a:t>
-                      </a:r>
-                      <a:endParaRPr lang="de-DE" sz="2800" dirty="0"/>
-                    </a:p>
-                  </a:txBody>
-                  <a:tcPr/>
-                </a:tc>
-              </a:tr>
-              <a:tr h="370840">
-                <a:tc>
-                  <a:txBody>
-                    <a:bodyPr/>
-                    <a:lstStyle/>
-                    <a:p>
-                      <a:r>
-                        <a:rPr lang="de-DE" sz="2800" dirty="0" smtClean="0"/>
-                        <a:t>DOM-</a:t>
-                      </a:r>
-                      <a:r>
-                        <a:rPr lang="de-DE" sz="2800" dirty="0" err="1" smtClean="0"/>
-                        <a:t>like</a:t>
-                      </a:r>
-                      <a:r>
-                        <a:rPr lang="de-DE" sz="2800" dirty="0" smtClean="0"/>
-                        <a:t> </a:t>
-                      </a:r>
-                      <a:r>
-                        <a:rPr lang="de-DE" sz="2800" dirty="0" err="1" smtClean="0"/>
-                        <a:t>navigation</a:t>
-                      </a:r>
-                      <a:endParaRPr lang="de-DE" sz="2800" dirty="0"/>
-                    </a:p>
-                  </a:txBody>
-                  <a:tcPr/>
-                </a:tc>
-                <a:tc>
-                  <a:txBody>
-                    <a:bodyPr/>
-                    <a:lstStyle/>
-                    <a:p>
-                      <a:r>
-                        <a:rPr lang="de-DE" sz="2800" dirty="0" err="1" smtClean="0"/>
-                        <a:t>yes</a:t>
-                      </a:r>
-                      <a:endParaRPr lang="de-DE" sz="2800" dirty="0"/>
-                    </a:p>
-                  </a:txBody>
-                  <a:tcPr/>
-                </a:tc>
-                <a:tc>
-                  <a:txBody>
-                    <a:bodyPr/>
-                    <a:lstStyle/>
-                    <a:p>
-                      <a:r>
-                        <a:rPr lang="de-DE" sz="2800" dirty="0" err="1" smtClean="0"/>
-                        <a:t>partially</a:t>
-                      </a:r>
-                      <a:endParaRPr lang="de-DE" sz="2800" dirty="0"/>
-                    </a:p>
-                  </a:txBody>
-                  <a:tcPr/>
-                </a:tc>
-              </a:tr>
-              <a:tr h="370840">
-                <a:tc>
-                  <a:txBody>
-                    <a:bodyPr/>
-                    <a:lstStyle/>
-                    <a:p>
-                      <a:r>
-                        <a:rPr lang="de-DE" sz="2800" dirty="0" smtClean="0"/>
-                        <a:t>Fast</a:t>
-                      </a:r>
-                      <a:r>
-                        <a:rPr lang="de-DE" sz="2800" baseline="0" dirty="0" smtClean="0"/>
-                        <a:t> (1 MB </a:t>
-                      </a:r>
-                      <a:r>
-                        <a:rPr lang="de-DE" sz="2800" baseline="0" dirty="0" err="1" smtClean="0"/>
-                        <a:t>page</a:t>
-                      </a:r>
-                      <a:r>
-                        <a:rPr lang="de-DE" sz="2800" baseline="0" dirty="0" smtClean="0"/>
-                        <a:t> / sec)</a:t>
-                      </a:r>
-                      <a:endParaRPr lang="de-DE" sz="2800" dirty="0"/>
-                    </a:p>
-                  </a:txBody>
-                  <a:tcPr/>
-                </a:tc>
-                <a:tc>
-                  <a:txBody>
-                    <a:bodyPr/>
-                    <a:lstStyle/>
-                    <a:p>
-                      <a:r>
-                        <a:rPr lang="de-DE" sz="2800" dirty="0" err="1" smtClean="0"/>
-                        <a:t>yes</a:t>
-                      </a:r>
-                      <a:endParaRPr lang="de-DE" sz="2800" dirty="0"/>
-                    </a:p>
-                  </a:txBody>
-                  <a:tcPr/>
-                </a:tc>
-                <a:tc>
-                  <a:txBody>
-                    <a:bodyPr/>
-                    <a:lstStyle/>
-                    <a:p>
-                      <a:r>
-                        <a:rPr lang="de-DE" sz="2800" dirty="0" err="1" smtClean="0"/>
-                        <a:t>no</a:t>
-                      </a:r>
-                      <a:endParaRPr lang="de-DE" sz="2800" dirty="0"/>
-                    </a:p>
-                  </a:txBody>
-                  <a:tcPr/>
-                </a:tc>
-              </a:tr>
-            </a:tbl>
-          </a:graphicData>
-        </a:graphic>
-      </p:graphicFrame>
-    </p:spTree>
-    <p:extLst>
-      <p:ext uri="{BB962C8B-B14F-4D97-AF65-F5344CB8AC3E}">
-        <p14:creationId xmlns:p14="http://schemas.microsoft.com/office/powerpoint/2010/main" val="2918949600"/>
       </p:ext>
     </p:extLst>
   </p:cSld>
@@ -6320,6 +7102,451 @@
           <a:lstStyle/>
           <a:p>
             <a:r>
+              <a:rPr lang="de-DE" dirty="0" err="1" smtClean="0"/>
+              <a:t>Decisions</a:t>
+            </a:r>
+            <a:endParaRPr lang="de-DE" dirty="0"/>
+          </a:p>
+        </p:txBody>
+      </p:sp>
+      <p:sp>
+        <p:nvSpPr>
+          <p:cNvPr id="3" name="Inhaltsplatzhalter 2"/>
+          <p:cNvSpPr>
+            <a:spLocks noGrp="1"/>
+          </p:cNvSpPr>
+          <p:nvPr>
+            <p:ph idx="1"/>
+          </p:nvPr>
+        </p:nvSpPr>
+        <p:spPr>
+          <a:xfrm>
+            <a:off x="431540" y="5126276"/>
+            <a:ext cx="8229600" cy="990992"/>
+          </a:xfrm>
+        </p:spPr>
+        <p:txBody>
+          <a:bodyPr/>
+          <a:lstStyle/>
+          <a:p>
+            <a:r>
+              <a:rPr lang="de-DE" dirty="0" err="1" smtClean="0"/>
+              <a:t>Result</a:t>
+            </a:r>
+            <a:r>
+              <a:rPr lang="de-DE" dirty="0" smtClean="0"/>
+              <a:t>: </a:t>
+            </a:r>
+            <a:r>
+              <a:rPr lang="de-DE" dirty="0" err="1" smtClean="0"/>
+              <a:t>Jsoup</a:t>
+            </a:r>
+            <a:r>
+              <a:rPr lang="de-DE" dirty="0" smtClean="0"/>
+              <a:t> </a:t>
+            </a:r>
+            <a:r>
+              <a:rPr lang="de-DE" dirty="0" err="1" smtClean="0"/>
+              <a:t>as</a:t>
+            </a:r>
+            <a:r>
+              <a:rPr lang="de-DE" dirty="0" smtClean="0"/>
+              <a:t> HTML </a:t>
+            </a:r>
+            <a:r>
+              <a:rPr lang="de-DE" dirty="0" err="1" smtClean="0"/>
+              <a:t>parser</a:t>
+            </a:r>
+            <a:r>
+              <a:rPr lang="de-DE" dirty="0" smtClean="0"/>
+              <a:t> </a:t>
+            </a:r>
+            <a:r>
+              <a:rPr lang="de-DE" sz="2400" dirty="0" smtClean="0"/>
+              <a:t>(http://</a:t>
+            </a:r>
+            <a:r>
+              <a:rPr lang="de-DE" sz="2400" dirty="0" err="1" smtClean="0"/>
+              <a:t>jsoup.org</a:t>
+            </a:r>
+            <a:r>
+              <a:rPr lang="de-DE" sz="2400" dirty="0" smtClean="0"/>
+              <a:t>)</a:t>
+            </a:r>
+            <a:endParaRPr lang="de-DE" dirty="0" smtClean="0"/>
+          </a:p>
+        </p:txBody>
+      </p:sp>
+      <p:graphicFrame>
+        <p:nvGraphicFramePr>
+          <p:cNvPr id="4" name="Tabelle 3"/>
+          <p:cNvGraphicFramePr>
+            <a:graphicFrameLocks noGrp="1"/>
+          </p:cNvGraphicFramePr>
+          <p:nvPr>
+            <p:extLst>
+              <p:ext uri="{D42A27DB-BD31-4B8C-83A1-F6EECF244321}">
+                <p14:modId xmlns:p14="http://schemas.microsoft.com/office/powerpoint/2010/main" val="1304009508"/>
+              </p:ext>
+            </p:extLst>
+          </p:nvPr>
+        </p:nvGraphicFramePr>
+        <p:xfrm>
+          <a:off x="431540" y="1589096"/>
+          <a:ext cx="7971573" cy="3017519"/>
+        </p:xfrm>
+        <a:graphic>
+          <a:graphicData uri="http://schemas.openxmlformats.org/drawingml/2006/table">
+            <a:tbl>
+              <a:tblPr firstRow="1" bandRow="1">
+                <a:tableStyleId>{5C22544A-7EE6-4342-B048-85BDC9FD1C3A}</a:tableStyleId>
+              </a:tblPr>
+              <a:tblGrid>
+                <a:gridCol w="3750774"/>
+                <a:gridCol w="1847402"/>
+                <a:gridCol w="2373397"/>
+              </a:tblGrid>
+              <a:tr h="370840">
+                <a:tc>
+                  <a:txBody>
+                    <a:bodyPr/>
+                    <a:lstStyle/>
+                    <a:p>
+                      <a:r>
+                        <a:rPr lang="de-DE" sz="2800" dirty="0" err="1" smtClean="0"/>
+                        <a:t>Criteria</a:t>
+                      </a:r>
+                      <a:endParaRPr lang="de-DE" sz="2800" dirty="0"/>
+                    </a:p>
+                  </a:txBody>
+                  <a:tcPr/>
+                </a:tc>
+                <a:tc>
+                  <a:txBody>
+                    <a:bodyPr/>
+                    <a:lstStyle/>
+                    <a:p>
+                      <a:r>
+                        <a:rPr lang="de-DE" sz="2800" dirty="0" smtClean="0"/>
+                        <a:t>A1:</a:t>
+                      </a:r>
+                      <a:r>
+                        <a:rPr lang="de-DE" sz="2800" baseline="0" dirty="0" smtClean="0"/>
+                        <a:t> </a:t>
+                      </a:r>
+                      <a:r>
+                        <a:rPr lang="de-DE" sz="2800" baseline="0" dirty="0" err="1" smtClean="0"/>
+                        <a:t>Jsoup</a:t>
+                      </a:r>
+                      <a:endParaRPr lang="de-DE" sz="2800" dirty="0"/>
+                    </a:p>
+                  </a:txBody>
+                  <a:tcPr/>
+                </a:tc>
+                <a:tc>
+                  <a:txBody>
+                    <a:bodyPr/>
+                    <a:lstStyle/>
+                    <a:p>
+                      <a:r>
+                        <a:rPr lang="de-DE" sz="2800" dirty="0" smtClean="0"/>
+                        <a:t>A2: </a:t>
+                      </a:r>
+                      <a:r>
+                        <a:rPr lang="de-DE" sz="2800" dirty="0" err="1" smtClean="0"/>
+                        <a:t>HTMLUnit</a:t>
+                      </a:r>
+                      <a:endParaRPr lang="de-DE" sz="2800" dirty="0"/>
+                    </a:p>
+                  </a:txBody>
+                  <a:tcPr/>
+                </a:tc>
+              </a:tr>
+              <a:tr h="370840">
+                <a:tc>
+                  <a:txBody>
+                    <a:bodyPr/>
+                    <a:lstStyle/>
+                    <a:p>
+                      <a:r>
+                        <a:rPr lang="de-DE" sz="2800" dirty="0" err="1" smtClean="0"/>
+                        <a:t>No</a:t>
+                      </a:r>
+                      <a:r>
+                        <a:rPr lang="de-DE" sz="2800" dirty="0" smtClean="0"/>
+                        <a:t> (!) </a:t>
+                      </a:r>
+                      <a:r>
+                        <a:rPr lang="de-DE" sz="2800" dirty="0" err="1" smtClean="0"/>
+                        <a:t>external</a:t>
+                      </a:r>
+                      <a:r>
+                        <a:rPr lang="de-DE" sz="2800" dirty="0" smtClean="0"/>
+                        <a:t> </a:t>
+                      </a:r>
+                      <a:r>
+                        <a:rPr lang="de-DE" sz="2800" dirty="0" err="1" smtClean="0"/>
+                        <a:t>dependencies</a:t>
+                      </a:r>
+                      <a:endParaRPr lang="de-DE" sz="2800" dirty="0"/>
+                    </a:p>
+                  </a:txBody>
+                  <a:tcPr/>
+                </a:tc>
+                <a:tc>
+                  <a:txBody>
+                    <a:bodyPr/>
+                    <a:lstStyle/>
+                    <a:p>
+                      <a:r>
+                        <a:rPr lang="de-DE" sz="2800" dirty="0" err="1" smtClean="0"/>
+                        <a:t>No</a:t>
+                      </a:r>
+                      <a:r>
+                        <a:rPr lang="de-DE" sz="2800" dirty="0" smtClean="0"/>
+                        <a:t> </a:t>
+                      </a:r>
+                      <a:r>
+                        <a:rPr lang="de-DE" sz="2800" dirty="0" err="1" smtClean="0"/>
+                        <a:t>deps</a:t>
+                      </a:r>
+                      <a:endParaRPr lang="de-DE" sz="2800" dirty="0"/>
+                    </a:p>
+                  </a:txBody>
+                  <a:tcPr/>
+                </a:tc>
+                <a:tc>
+                  <a:txBody>
+                    <a:bodyPr/>
+                    <a:lstStyle/>
+                    <a:p>
+                      <a:r>
+                        <a:rPr lang="de-DE" sz="2800" dirty="0" smtClean="0"/>
+                        <a:t>&gt;15 </a:t>
+                      </a:r>
+                      <a:r>
+                        <a:rPr lang="de-DE" sz="2800" dirty="0" err="1" smtClean="0"/>
+                        <a:t>deps</a:t>
+                      </a:r>
+                      <a:endParaRPr lang="de-DE" sz="2800" dirty="0"/>
+                    </a:p>
+                  </a:txBody>
+                  <a:tcPr/>
+                </a:tc>
+              </a:tr>
+              <a:tr h="370840">
+                <a:tc>
+                  <a:txBody>
+                    <a:bodyPr/>
+                    <a:lstStyle/>
+                    <a:p>
+                      <a:r>
+                        <a:rPr lang="de-DE" sz="2800" dirty="0" smtClean="0"/>
+                        <a:t>Simple API</a:t>
+                      </a:r>
+                      <a:endParaRPr lang="de-DE" sz="2800" dirty="0"/>
+                    </a:p>
+                  </a:txBody>
+                  <a:tcPr/>
+                </a:tc>
+                <a:tc>
+                  <a:txBody>
+                    <a:bodyPr/>
+                    <a:lstStyle/>
+                    <a:p>
+                      <a:r>
+                        <a:rPr lang="de-DE" sz="2800" dirty="0" smtClean="0"/>
+                        <a:t>simple</a:t>
+                      </a:r>
+                      <a:endParaRPr lang="de-DE" sz="2800" dirty="0"/>
+                    </a:p>
+                  </a:txBody>
+                  <a:tcPr/>
+                </a:tc>
+                <a:tc>
+                  <a:txBody>
+                    <a:bodyPr/>
+                    <a:lstStyle/>
+                    <a:p>
+                      <a:r>
+                        <a:rPr lang="de-DE" sz="2800" dirty="0" smtClean="0"/>
+                        <a:t>simple</a:t>
+                      </a:r>
+                      <a:endParaRPr lang="de-DE" sz="2800" dirty="0"/>
+                    </a:p>
+                  </a:txBody>
+                  <a:tcPr/>
+                </a:tc>
+              </a:tr>
+              <a:tr h="370840">
+                <a:tc>
+                  <a:txBody>
+                    <a:bodyPr/>
+                    <a:lstStyle/>
+                    <a:p>
+                      <a:r>
+                        <a:rPr lang="de-DE" sz="2800" dirty="0" smtClean="0"/>
+                        <a:t>DOM-</a:t>
+                      </a:r>
+                      <a:r>
+                        <a:rPr lang="de-DE" sz="2800" dirty="0" err="1" smtClean="0"/>
+                        <a:t>like</a:t>
+                      </a:r>
+                      <a:r>
+                        <a:rPr lang="de-DE" sz="2800" dirty="0" smtClean="0"/>
+                        <a:t> </a:t>
+                      </a:r>
+                      <a:r>
+                        <a:rPr lang="de-DE" sz="2800" dirty="0" err="1" smtClean="0"/>
+                        <a:t>navigation</a:t>
+                      </a:r>
+                      <a:endParaRPr lang="de-DE" sz="2800" dirty="0"/>
+                    </a:p>
+                  </a:txBody>
+                  <a:tcPr/>
+                </a:tc>
+                <a:tc>
+                  <a:txBody>
+                    <a:bodyPr/>
+                    <a:lstStyle/>
+                    <a:p>
+                      <a:r>
+                        <a:rPr lang="de-DE" sz="2800" dirty="0" err="1" smtClean="0"/>
+                        <a:t>yes</a:t>
+                      </a:r>
+                      <a:endParaRPr lang="de-DE" sz="2800" dirty="0"/>
+                    </a:p>
+                  </a:txBody>
+                  <a:tcPr/>
+                </a:tc>
+                <a:tc>
+                  <a:txBody>
+                    <a:bodyPr/>
+                    <a:lstStyle/>
+                    <a:p>
+                      <a:r>
+                        <a:rPr lang="de-DE" sz="2800" dirty="0" err="1" smtClean="0"/>
+                        <a:t>partially</a:t>
+                      </a:r>
+                      <a:endParaRPr lang="de-DE" sz="2800" dirty="0"/>
+                    </a:p>
+                  </a:txBody>
+                  <a:tcPr/>
+                </a:tc>
+              </a:tr>
+              <a:tr h="370840">
+                <a:tc>
+                  <a:txBody>
+                    <a:bodyPr/>
+                    <a:lstStyle/>
+                    <a:p>
+                      <a:r>
+                        <a:rPr lang="de-DE" sz="2800" dirty="0" smtClean="0"/>
+                        <a:t>Fast</a:t>
+                      </a:r>
+                      <a:r>
+                        <a:rPr lang="de-DE" sz="2800" baseline="0" dirty="0" smtClean="0"/>
+                        <a:t> (1 MB </a:t>
+                      </a:r>
+                      <a:r>
+                        <a:rPr lang="de-DE" sz="2800" baseline="0" dirty="0" err="1" smtClean="0"/>
+                        <a:t>page</a:t>
+                      </a:r>
+                      <a:r>
+                        <a:rPr lang="de-DE" sz="2800" baseline="0" dirty="0" smtClean="0"/>
+                        <a:t> / sec)</a:t>
+                      </a:r>
+                      <a:endParaRPr lang="de-DE" sz="2800" dirty="0"/>
+                    </a:p>
+                  </a:txBody>
+                  <a:tcPr/>
+                </a:tc>
+                <a:tc>
+                  <a:txBody>
+                    <a:bodyPr/>
+                    <a:lstStyle/>
+                    <a:p>
+                      <a:r>
+                        <a:rPr lang="de-DE" sz="2800" dirty="0" err="1" smtClean="0"/>
+                        <a:t>yes</a:t>
+                      </a:r>
+                      <a:endParaRPr lang="de-DE" sz="2800" dirty="0"/>
+                    </a:p>
+                  </a:txBody>
+                  <a:tcPr/>
+                </a:tc>
+                <a:tc>
+                  <a:txBody>
+                    <a:bodyPr/>
+                    <a:lstStyle/>
+                    <a:p>
+                      <a:r>
+                        <a:rPr lang="de-DE" sz="2800" dirty="0" err="1" smtClean="0"/>
+                        <a:t>no</a:t>
+                      </a:r>
+                      <a:endParaRPr lang="de-DE" sz="2800" dirty="0"/>
+                    </a:p>
+                  </a:txBody>
+                  <a:tcPr/>
+                </a:tc>
+              </a:tr>
+            </a:tbl>
+          </a:graphicData>
+        </a:graphic>
+      </p:graphicFrame>
+    </p:spTree>
+    <p:extLst>
+      <p:ext uri="{BB962C8B-B14F-4D97-AF65-F5344CB8AC3E}">
+        <p14:creationId xmlns:p14="http://schemas.microsoft.com/office/powerpoint/2010/main" val="2918949600"/>
+      </p:ext>
+    </p:extLst>
+  </p:cSld>
+  <p:clrMapOvr>
+    <a:masterClrMapping/>
+  </p:clrMapOvr>
+  <p:timing>
+    <p:tnLst>
+      <p:par>
+        <p:cTn xmlns:p14="http://schemas.microsoft.com/office/powerpoint/2010/main" id="1" dur="indefinite" restart="never" nodeType="tmRoot"/>
+      </p:par>
+    </p:tnLst>
+  </p:timing>
+</p:sld>
+</file>
+
+<file path=ppt/slides/slide26.xml><?xml version="1.0" encoding="utf-8"?>
+<p:sld xmlns:a="http://schemas.openxmlformats.org/drawingml/2006/main" xmlns:r="http://schemas.openxmlformats.org/officeDocument/2006/relationships" xmlns:p="http://schemas.openxmlformats.org/presentationml/2006/main">
+  <p:cSld>
+    <p:spTree>
+      <p:nvGrpSpPr>
+        <p:cNvPr id="1" name=""/>
+        <p:cNvGrpSpPr/>
+        <p:nvPr/>
+      </p:nvGrpSpPr>
+      <p:grpSpPr>
+        <a:xfrm>
+          <a:off x="0" y="0"/>
+          <a:ext cx="0" cy="0"/>
+          <a:chOff x="0" y="0"/>
+          <a:chExt cx="0" cy="0"/>
+        </a:xfrm>
+      </p:grpSpPr>
+      <p:sp>
+        <p:nvSpPr>
+          <p:cNvPr id="2" name="Titel 1"/>
+          <p:cNvSpPr>
+            <a:spLocks noGrp="1"/>
+          </p:cNvSpPr>
+          <p:nvPr>
+            <p:ph type="title"/>
+          </p:nvPr>
+        </p:nvSpPr>
+        <p:spPr/>
+        <p:txBody>
+          <a:bodyPr/>
+          <a:lstStyle/>
+          <a:p>
+            <a:r>
               <a:rPr lang="de-DE" dirty="0" smtClean="0"/>
               <a:t>Open </a:t>
             </a:r>
@@ -6407,7 +7634,7 @@
 </p:sld>
 </file>
 
-<file path=ppt/slides/slide26.xml><?xml version="1.0" encoding="utf-8"?>
+<file path=ppt/slides/slide27.xml><?xml version="1.0" encoding="utf-8"?>
 <p:sld xmlns:a="http://schemas.openxmlformats.org/drawingml/2006/main" xmlns:r="http://schemas.openxmlformats.org/officeDocument/2006/relationships" xmlns:p="http://schemas.openxmlformats.org/presentationml/2006/main">
   <p:cSld>
     <p:spTree>
@@ -6727,7 +7954,12 @@
             <p:ph type="title"/>
           </p:nvPr>
         </p:nvSpPr>
-        <p:spPr/>
+        <p:spPr>
+          <a:xfrm>
+            <a:off x="1116134" y="-24320"/>
+            <a:ext cx="6993348" cy="1384053"/>
+          </a:xfrm>
+        </p:spPr>
         <p:txBody>
           <a:bodyPr/>
           <a:lstStyle/>
@@ -6742,12 +7974,179 @@
             </a:r>
             <a:r>
               <a:rPr lang="de-DE" dirty="0" smtClean="0"/>
-              <a:t> Business Goals</a:t>
+              <a:t> </a:t>
+            </a:r>
+            <a:r>
+              <a:rPr lang="de-DE" dirty="0" smtClean="0"/>
+              <a:t>(Business) Goal</a:t>
             </a:r>
             <a:endParaRPr lang="de-DE" dirty="0"/>
           </a:p>
         </p:txBody>
       </p:sp>
+      <p:grpSp>
+        <p:nvGrpSpPr>
+          <p:cNvPr id="4" name="Gruppierung 3"/>
+          <p:cNvGrpSpPr/>
+          <p:nvPr/>
+        </p:nvGrpSpPr>
+        <p:grpSpPr>
+          <a:xfrm>
+            <a:off x="2015099" y="2256582"/>
+            <a:ext cx="5086474" cy="2901896"/>
+            <a:chOff x="2015099" y="2256582"/>
+            <a:chExt cx="5086474" cy="2901896"/>
+          </a:xfrm>
+        </p:grpSpPr>
+        <p:sp>
+          <p:nvSpPr>
+            <p:cNvPr id="3" name="Textfeld 2"/>
+            <p:cNvSpPr txBox="1"/>
+            <p:nvPr/>
+          </p:nvSpPr>
+          <p:spPr>
+            <a:xfrm>
+              <a:off x="2015099" y="2296156"/>
+              <a:ext cx="5086474" cy="2862322"/>
+            </a:xfrm>
+            <a:prstGeom prst="rect">
+              <a:avLst/>
+            </a:prstGeom>
+          </p:spPr>
+          <p:style>
+            <a:lnRef idx="1">
+              <a:schemeClr val="accent1"/>
+            </a:lnRef>
+            <a:fillRef idx="2">
+              <a:schemeClr val="accent1"/>
+            </a:fillRef>
+            <a:effectRef idx="1">
+              <a:schemeClr val="accent1"/>
+            </a:effectRef>
+            <a:fontRef idx="minor">
+              <a:schemeClr val="dk1"/>
+            </a:fontRef>
+          </p:style>
+          <p:txBody>
+            <a:bodyPr wrap="none" rtlCol="0">
+              <a:spAutoFit/>
+            </a:bodyPr>
+            <a:lstStyle/>
+            <a:p>
+              <a:pPr algn="ctr"/>
+              <a:r>
+                <a:rPr lang="en-US" sz="3600" dirty="0" smtClean="0"/>
+                <a:t>  shall support authors </a:t>
+              </a:r>
+            </a:p>
+            <a:p>
+              <a:pPr algn="ctr"/>
+              <a:r>
+                <a:rPr lang="en-US" sz="3600" dirty="0" smtClean="0"/>
+                <a:t>creating digital formats</a:t>
+              </a:r>
+            </a:p>
+            <a:p>
+              <a:pPr algn="ctr"/>
+              <a:r>
+                <a:rPr lang="en-US" sz="3600" dirty="0" smtClean="0"/>
+                <a:t>with hyperlinks and </a:t>
+              </a:r>
+            </a:p>
+            <a:p>
+              <a:pPr algn="ctr"/>
+              <a:r>
+                <a:rPr lang="en-US" sz="3600" dirty="0" smtClean="0"/>
+                <a:t>integration of images and </a:t>
+              </a:r>
+            </a:p>
+            <a:p>
+              <a:pPr algn="ctr"/>
+              <a:r>
+                <a:rPr lang="en-US" sz="3600" dirty="0" smtClean="0"/>
+                <a:t>similar resources.“</a:t>
+              </a:r>
+              <a:endParaRPr lang="en-US" sz="3600" dirty="0"/>
+            </a:p>
+          </p:txBody>
+        </p:sp>
+        <p:pic>
+          <p:nvPicPr>
+            <p:cNvPr id="6" name="Bild 5" descr="htmlsanitycheck-logo.png"/>
+            <p:cNvPicPr>
+              <a:picLocks noChangeAspect="1"/>
+            </p:cNvPicPr>
+            <p:nvPr/>
+          </p:nvPicPr>
+          <p:blipFill>
+            <a:blip r:embed="rId2">
+              <a:extLst>
+                <a:ext uri="{BEBA8EAE-BF5A-486C-A8C5-ECC9F3942E4B}">
+                  <a14:imgProps xmlns:a14="http://schemas.microsoft.com/office/drawing/2010/main">
+                    <a14:imgLayer r:embed="rId3">
+                      <a14:imgEffect>
+                        <a14:backgroundRemoval t="10000" b="90000" l="10000" r="90000"/>
+                      </a14:imgEffect>
+                    </a14:imgLayer>
+                  </a14:imgProps>
+                </a:ext>
+                <a:ext uri="{28A0092B-C50C-407E-A947-70E740481C1C}">
+                  <a14:useLocalDpi xmlns:a14="http://schemas.microsoft.com/office/drawing/2010/main" val="0"/>
+                </a:ext>
+              </a:extLst>
+            </a:blip>
+            <a:stretch>
+              <a:fillRect/>
+            </a:stretch>
+          </p:blipFill>
+          <p:spPr>
+            <a:xfrm>
+              <a:off x="2052668" y="2256582"/>
+              <a:ext cx="656280" cy="808197"/>
+            </a:xfrm>
+            <a:prstGeom prst="rect">
+              <a:avLst/>
+            </a:prstGeom>
+          </p:spPr>
+        </p:pic>
+      </p:grpSp>
+    </p:spTree>
+    <p:extLst>
+      <p:ext uri="{BB962C8B-B14F-4D97-AF65-F5344CB8AC3E}">
+        <p14:creationId xmlns:p14="http://schemas.microsoft.com/office/powerpoint/2010/main" val="4098063824"/>
+      </p:ext>
+    </p:extLst>
+  </p:cSld>
+  <p:clrMapOvr>
+    <a:masterClrMapping/>
+  </p:clrMapOvr>
+  <p:timing>
+    <p:tnLst>
+      <p:par>
+        <p:cTn xmlns:p14="http://schemas.microsoft.com/office/powerpoint/2010/main" id="1" dur="indefinite" restart="never" nodeType="tmRoot"/>
+      </p:par>
+    </p:tnLst>
+  </p:timing>
+</p:sld>
+</file>
+
+<file path=ppt/slides/slide4.xml><?xml version="1.0" encoding="utf-8"?>
+<p:sld xmlns:a="http://schemas.openxmlformats.org/drawingml/2006/main" xmlns:r="http://schemas.openxmlformats.org/officeDocument/2006/relationships" xmlns:p="http://schemas.openxmlformats.org/presentationml/2006/main">
+  <p:cSld>
+    <p:spTree>
+      <p:nvGrpSpPr>
+        <p:cNvPr id="1" name=""/>
+        <p:cNvGrpSpPr/>
+        <p:nvPr/>
+      </p:nvGrpSpPr>
+      <p:grpSpPr>
+        <a:xfrm>
+          <a:off x="0" y="0"/>
+          <a:ext cx="0" cy="0"/>
+          <a:chOff x="0" y="0"/>
+          <a:chExt cx="0" cy="0"/>
+        </a:xfrm>
+      </p:grpSpPr>
       <p:pic>
         <p:nvPicPr>
           <p:cNvPr id="5" name="Bild 4" descr="htmlsanitycheck-overview.png"/>
@@ -6770,7 +8169,7 @@
         </p:blipFill>
         <p:spPr>
           <a:xfrm>
-            <a:off x="774662" y="1532684"/>
+            <a:off x="875008" y="1660961"/>
             <a:ext cx="7327900" cy="4686300"/>
           </a:xfrm>
           <a:prstGeom prst="rect">
@@ -6778,10 +8177,38 @@
           </a:prstGeom>
         </p:spPr>
       </p:pic>
+      <p:sp>
+        <p:nvSpPr>
+          <p:cNvPr id="2" name="Titel 1"/>
+          <p:cNvSpPr>
+            <a:spLocks noGrp="1"/>
+          </p:cNvSpPr>
+          <p:nvPr>
+            <p:ph type="title"/>
+          </p:nvPr>
+        </p:nvSpPr>
+        <p:spPr>
+          <a:xfrm>
+            <a:off x="1116134" y="-24319"/>
+            <a:ext cx="6993348" cy="1143000"/>
+          </a:xfrm>
+        </p:spPr>
+        <p:txBody>
+          <a:bodyPr/>
+          <a:lstStyle/>
+          <a:p>
+            <a:r>
+              <a:rPr lang="de-DE" dirty="0" err="1" smtClean="0"/>
+              <a:t>Overview</a:t>
+            </a:r>
+            <a:endParaRPr lang="de-DE" dirty="0"/>
+          </a:p>
+        </p:txBody>
+      </p:sp>
     </p:spTree>
     <p:extLst>
       <p:ext uri="{BB962C8B-B14F-4D97-AF65-F5344CB8AC3E}">
-        <p14:creationId xmlns:p14="http://schemas.microsoft.com/office/powerpoint/2010/main" val="2264158966"/>
+        <p14:creationId xmlns:p14="http://schemas.microsoft.com/office/powerpoint/2010/main" val="3345118961"/>
       </p:ext>
     </p:extLst>
   </p:cSld>
@@ -6798,7 +8225,7 @@
 </p:sld>
 </file>
 
-<file path=ppt/slides/slide4.xml><?xml version="1.0" encoding="utf-8"?>
+<file path=ppt/slides/slide5.xml><?xml version="1.0" encoding="utf-8"?>
 <p:sld xmlns:a="http://schemas.openxmlformats.org/drawingml/2006/main" xmlns:r="http://schemas.openxmlformats.org/officeDocument/2006/relationships" xmlns:p="http://schemas.openxmlformats.org/presentationml/2006/main">
   <p:cSld>
     <p:spTree>
@@ -6967,7 +8394,7 @@
 </p:sld>
 </file>
 
-<file path=ppt/slides/slide5.xml><?xml version="1.0" encoding="utf-8"?>
+<file path=ppt/slides/slide6.xml><?xml version="1.0" encoding="utf-8"?>
 <p:sld xmlns:a="http://schemas.openxmlformats.org/drawingml/2006/main" xmlns:r="http://schemas.openxmlformats.org/officeDocument/2006/relationships" xmlns:p="http://schemas.openxmlformats.org/presentationml/2006/main">
   <p:cSld>
     <p:spTree>
@@ -7168,7 +8595,7 @@
 </p:sld>
 </file>
 
-<file path=ppt/slides/slide6.xml><?xml version="1.0" encoding="utf-8"?>
+<file path=ppt/slides/slide7.xml><?xml version="1.0" encoding="utf-8"?>
 <p:sld xmlns:a="http://schemas.openxmlformats.org/drawingml/2006/main" xmlns:r="http://schemas.openxmlformats.org/officeDocument/2006/relationships" xmlns:p="http://schemas.openxmlformats.org/presentationml/2006/main">
   <p:cSld>
     <p:spTree>
@@ -7422,7 +8849,7 @@
 </p:sld>
 </file>
 
-<file path=ppt/slides/slide7.xml><?xml version="1.0" encoding="utf-8"?>
+<file path=ppt/slides/slide8.xml><?xml version="1.0" encoding="utf-8"?>
 <p:sld xmlns:a="http://schemas.openxmlformats.org/drawingml/2006/main" xmlns:r="http://schemas.openxmlformats.org/officeDocument/2006/relationships" xmlns:p="http://schemas.openxmlformats.org/presentationml/2006/main">
   <p:cSld>
     <p:spTree>
@@ -7512,7 +8939,7 @@
 </p:sld>
 </file>
 
-<file path=ppt/slides/slide8.xml><?xml version="1.0" encoding="utf-8"?>
+<file path=ppt/slides/slide9.xml><?xml version="1.0" encoding="utf-8"?>
 <p:sld xmlns:a="http://schemas.openxmlformats.org/drawingml/2006/main" xmlns:r="http://schemas.openxmlformats.org/officeDocument/2006/relationships" xmlns:p="http://schemas.openxmlformats.org/presentationml/2006/main">
   <p:cSld>
     <p:spTree>
@@ -8434,763 +9861,6 @@
     <p:extLst>
       <p:ext uri="{BB962C8B-B14F-4D97-AF65-F5344CB8AC3E}">
         <p14:creationId xmlns:p14="http://schemas.microsoft.com/office/powerpoint/2010/main" val="3088496672"/>
-      </p:ext>
-    </p:extLst>
-  </p:cSld>
-  <p:clrMapOvr>
-    <a:masterClrMapping/>
-  </p:clrMapOvr>
-  <p:timing>
-    <p:tnLst>
-      <p:par>
-        <p:cTn xmlns:p14="http://schemas.microsoft.com/office/powerpoint/2010/main" id="1" dur="indefinite" restart="never" nodeType="tmRoot"/>
-      </p:par>
-    </p:tnLst>
-  </p:timing>
-</p:sld>
-</file>
-
-<file path=ppt/slides/slide9.xml><?xml version="1.0" encoding="utf-8"?>
-<p:sld xmlns:a="http://schemas.openxmlformats.org/drawingml/2006/main" xmlns:r="http://schemas.openxmlformats.org/officeDocument/2006/relationships" xmlns:p="http://schemas.openxmlformats.org/presentationml/2006/main">
-  <p:cSld>
-    <p:spTree>
-      <p:nvGrpSpPr>
-        <p:cNvPr id="1" name=""/>
-        <p:cNvGrpSpPr/>
-        <p:nvPr/>
-      </p:nvGrpSpPr>
-      <p:grpSpPr>
-        <a:xfrm>
-          <a:off x="0" y="0"/>
-          <a:ext cx="0" cy="0"/>
-          <a:chOff x="0" y="0"/>
-          <a:chExt cx="0" cy="0"/>
-        </a:xfrm>
-      </p:grpSpPr>
-      <p:sp>
-        <p:nvSpPr>
-          <p:cNvPr id="2" name="Titel 1"/>
-          <p:cNvSpPr>
-            <a:spLocks noGrp="1"/>
-          </p:cNvSpPr>
-          <p:nvPr>
-            <p:ph type="title"/>
-          </p:nvPr>
-        </p:nvSpPr>
-        <p:spPr/>
-        <p:txBody>
-          <a:bodyPr/>
-          <a:lstStyle/>
-          <a:p>
-            <a:r>
-              <a:rPr lang="de-DE" dirty="0" err="1" smtClean="0"/>
-              <a:t>Architecture</a:t>
-            </a:r>
-            <a:r>
-              <a:rPr lang="de-DE" dirty="0" smtClean="0"/>
-              <a:t> Quality Goals</a:t>
-            </a:r>
-            <a:endParaRPr lang="de-DE" dirty="0"/>
-          </a:p>
-        </p:txBody>
-      </p:sp>
-      <p:graphicFrame>
-        <p:nvGraphicFramePr>
-          <p:cNvPr id="5" name="Tabelle 4"/>
-          <p:cNvGraphicFramePr>
-            <a:graphicFrameLocks noGrp="1"/>
-          </p:cNvGraphicFramePr>
-          <p:nvPr>
-            <p:extLst>
-              <p:ext uri="{D42A27DB-BD31-4B8C-83A1-F6EECF244321}">
-                <p14:modId xmlns:p14="http://schemas.microsoft.com/office/powerpoint/2010/main" val="804301138"/>
-              </p:ext>
-            </p:extLst>
-          </p:nvPr>
-        </p:nvGraphicFramePr>
-        <p:xfrm>
-          <a:off x="359217" y="1789822"/>
-          <a:ext cx="8505747" cy="4089400"/>
-        </p:xfrm>
-        <a:graphic>
-          <a:graphicData uri="http://schemas.openxmlformats.org/drawingml/2006/table">
-            <a:tbl>
-              <a:tblPr firstRow="1" bandRow="1">
-                <a:tableStyleId>{22838BEF-8BB2-4498-84A7-C5851F593DF1}</a:tableStyleId>
-              </a:tblPr>
-              <a:tblGrid>
-                <a:gridCol w="1195739"/>
-                <a:gridCol w="1883265"/>
-                <a:gridCol w="5426743"/>
-              </a:tblGrid>
-              <a:tr h="370840">
-                <a:tc>
-                  <a:txBody>
-                    <a:bodyPr/>
-                    <a:lstStyle/>
-                    <a:p>
-                      <a:r>
-                        <a:rPr lang="de-DE" dirty="0" err="1" smtClean="0"/>
-                        <a:t>Priority</a:t>
-                      </a:r>
-                      <a:endParaRPr lang="de-DE" dirty="0"/>
-                    </a:p>
-                  </a:txBody>
-                  <a:tcPr/>
-                </a:tc>
-                <a:tc>
-                  <a:txBody>
-                    <a:bodyPr/>
-                    <a:lstStyle/>
-                    <a:p>
-                      <a:r>
-                        <a:rPr lang="de-DE" dirty="0" smtClean="0"/>
-                        <a:t>Quality Goal</a:t>
-                      </a:r>
-                      <a:endParaRPr lang="de-DE" dirty="0"/>
-                    </a:p>
-                  </a:txBody>
-                  <a:tcPr/>
-                </a:tc>
-                <a:tc>
-                  <a:txBody>
-                    <a:bodyPr/>
-                    <a:lstStyle/>
-                    <a:p>
-                      <a:r>
-                        <a:rPr lang="de-DE" dirty="0" smtClean="0"/>
-                        <a:t>Scenario</a:t>
-                      </a:r>
-                      <a:endParaRPr lang="de-DE" dirty="0"/>
-                    </a:p>
-                  </a:txBody>
-                  <a:tcPr/>
-                </a:tc>
-              </a:tr>
-              <a:tr h="370840">
-                <a:tc>
-                  <a:txBody>
-                    <a:bodyPr/>
-                    <a:lstStyle/>
-                    <a:p>
-                      <a:r>
-                        <a:rPr lang="de-DE" dirty="0" smtClean="0"/>
-                        <a:t>1</a:t>
-                      </a:r>
-                      <a:endParaRPr lang="de-DE" dirty="0"/>
-                    </a:p>
-                  </a:txBody>
-                  <a:tcPr/>
-                </a:tc>
-                <a:tc>
-                  <a:txBody>
-                    <a:bodyPr/>
-                    <a:lstStyle/>
-                    <a:p>
-                      <a:r>
-                        <a:rPr lang="de-DE" sz="2400" dirty="0" smtClean="0"/>
-                        <a:t>Correctness</a:t>
-                      </a:r>
-                      <a:endParaRPr lang="de-DE" sz="2400" dirty="0"/>
-                    </a:p>
-                  </a:txBody>
-                  <a:tcPr/>
-                </a:tc>
-                <a:tc>
-                  <a:txBody>
-                    <a:bodyPr/>
-                    <a:lstStyle/>
-                    <a:p>
-                      <a:r>
-                        <a:rPr lang="de-DE" sz="2000" dirty="0" smtClean="0"/>
-                        <a:t>Every </a:t>
-                      </a:r>
-                      <a:r>
-                        <a:rPr lang="de-DE" sz="2000" dirty="0" err="1" smtClean="0"/>
-                        <a:t>broken</a:t>
-                      </a:r>
-                      <a:r>
-                        <a:rPr lang="de-DE" sz="2000" dirty="0" smtClean="0"/>
-                        <a:t> </a:t>
-                      </a:r>
-                      <a:r>
-                        <a:rPr lang="de-DE" sz="2000" dirty="0" err="1" smtClean="0"/>
-                        <a:t>internal</a:t>
-                      </a:r>
-                      <a:r>
-                        <a:rPr lang="de-DE" sz="2000" dirty="0" smtClean="0"/>
-                        <a:t> link (</a:t>
-                      </a:r>
-                      <a:r>
-                        <a:rPr lang="de-DE" sz="2000" dirty="0" err="1" smtClean="0"/>
-                        <a:t>cross</a:t>
-                      </a:r>
-                      <a:r>
-                        <a:rPr lang="de-DE" sz="2000" dirty="0" smtClean="0"/>
-                        <a:t> </a:t>
-                      </a:r>
-                      <a:r>
-                        <a:rPr lang="de-DE" sz="2000" dirty="0" err="1" smtClean="0"/>
-                        <a:t>reference</a:t>
-                      </a:r>
-                      <a:r>
-                        <a:rPr lang="de-DE" sz="2000" dirty="0" smtClean="0"/>
-                        <a:t>) </a:t>
-                      </a:r>
-                      <a:r>
-                        <a:rPr lang="de-DE" sz="2000" dirty="0" err="1" smtClean="0"/>
-                        <a:t>is</a:t>
-                      </a:r>
-                      <a:r>
-                        <a:rPr lang="de-DE" sz="2000" dirty="0" smtClean="0"/>
-                        <a:t> </a:t>
-                      </a:r>
-                      <a:r>
-                        <a:rPr lang="de-DE" sz="2000" dirty="0" err="1" smtClean="0"/>
-                        <a:t>found</a:t>
-                      </a:r>
-                      <a:endParaRPr lang="de-DE" sz="2000" dirty="0"/>
-                    </a:p>
-                  </a:txBody>
-                  <a:tcPr/>
-                </a:tc>
-              </a:tr>
-              <a:tr h="370840">
-                <a:tc>
-                  <a:txBody>
-                    <a:bodyPr/>
-                    <a:lstStyle/>
-                    <a:p>
-                      <a:r>
-                        <a:rPr lang="de-DE" dirty="0" smtClean="0"/>
-                        <a:t>1</a:t>
-                      </a:r>
-                      <a:endParaRPr lang="de-DE" dirty="0"/>
-                    </a:p>
-                  </a:txBody>
-                  <a:tcPr/>
-                </a:tc>
-                <a:tc>
-                  <a:txBody>
-                    <a:bodyPr/>
-                    <a:lstStyle/>
-                    <a:p>
-                      <a:r>
-                        <a:rPr lang="de-DE" sz="2400" dirty="0" smtClean="0"/>
-                        <a:t>Correctness</a:t>
-                      </a:r>
-                      <a:endParaRPr lang="de-DE" sz="2400" dirty="0"/>
-                    </a:p>
-                  </a:txBody>
-                  <a:tcPr/>
-                </a:tc>
-                <a:tc>
-                  <a:txBody>
-                    <a:bodyPr/>
-                    <a:lstStyle/>
-                    <a:p>
-                      <a:r>
-                        <a:rPr lang="de-DE" sz="2000" dirty="0" smtClean="0"/>
-                        <a:t>Every </a:t>
-                      </a:r>
-                      <a:r>
-                        <a:rPr lang="de-DE" sz="2000" dirty="0" err="1" smtClean="0"/>
-                        <a:t>missing</a:t>
-                      </a:r>
-                      <a:r>
-                        <a:rPr lang="de-DE" sz="2000" dirty="0" smtClean="0"/>
-                        <a:t> </a:t>
-                      </a:r>
-                      <a:r>
-                        <a:rPr lang="de-DE" sz="2000" dirty="0" err="1" smtClean="0"/>
-                        <a:t>local</a:t>
-                      </a:r>
-                      <a:r>
-                        <a:rPr lang="de-DE" sz="2000" dirty="0" smtClean="0"/>
-                        <a:t> </a:t>
-                      </a:r>
-                      <a:r>
-                        <a:rPr lang="de-DE" sz="2000" dirty="0" err="1" smtClean="0"/>
-                        <a:t>image</a:t>
-                      </a:r>
-                      <a:r>
-                        <a:rPr lang="de-DE" sz="2000" dirty="0" smtClean="0"/>
-                        <a:t> </a:t>
-                      </a:r>
-                      <a:r>
-                        <a:rPr lang="de-DE" sz="2000" dirty="0" err="1" smtClean="0"/>
-                        <a:t>is</a:t>
-                      </a:r>
-                      <a:r>
-                        <a:rPr lang="de-DE" sz="2000" dirty="0" smtClean="0"/>
-                        <a:t> </a:t>
-                      </a:r>
-                      <a:r>
-                        <a:rPr lang="de-DE" sz="2000" dirty="0" err="1" smtClean="0"/>
-                        <a:t>found</a:t>
-                      </a:r>
-                      <a:r>
-                        <a:rPr lang="de-DE" sz="2000" dirty="0" smtClean="0"/>
-                        <a:t>.</a:t>
-                      </a:r>
-                      <a:endParaRPr lang="de-DE" sz="2000" dirty="0"/>
-                    </a:p>
-                  </a:txBody>
-                  <a:tcPr/>
-                </a:tc>
-              </a:tr>
-              <a:tr h="370840">
-                <a:tc>
-                  <a:txBody>
-                    <a:bodyPr/>
-                    <a:lstStyle/>
-                    <a:p>
-                      <a:r>
-                        <a:rPr lang="de-DE" dirty="0" smtClean="0"/>
-                        <a:t>1</a:t>
-                      </a:r>
-                      <a:endParaRPr lang="de-DE" dirty="0"/>
-                    </a:p>
-                  </a:txBody>
-                  <a:tcPr/>
-                </a:tc>
-                <a:tc>
-                  <a:txBody>
-                    <a:bodyPr/>
-                    <a:lstStyle/>
-                    <a:p>
-                      <a:r>
-                        <a:rPr lang="de-DE" sz="2400" dirty="0" err="1" smtClean="0"/>
-                        <a:t>Safety</a:t>
-                      </a:r>
-                      <a:endParaRPr lang="de-DE" sz="2400" dirty="0"/>
-                    </a:p>
-                  </a:txBody>
-                  <a:tcPr/>
-                </a:tc>
-                <a:tc>
-                  <a:txBody>
-                    <a:bodyPr/>
-                    <a:lstStyle/>
-                    <a:p>
-                      <a:r>
-                        <a:rPr lang="de-DE" sz="2000" dirty="0" smtClean="0"/>
-                        <a:t>Content </a:t>
-                      </a:r>
-                      <a:r>
-                        <a:rPr lang="de-DE" sz="2000" dirty="0" err="1" smtClean="0"/>
-                        <a:t>of</a:t>
-                      </a:r>
-                      <a:r>
-                        <a:rPr lang="de-DE" sz="2000" dirty="0" smtClean="0"/>
-                        <a:t> </a:t>
-                      </a:r>
-                      <a:r>
-                        <a:rPr lang="de-DE" sz="2000" dirty="0" err="1" smtClean="0"/>
-                        <a:t>the</a:t>
-                      </a:r>
-                      <a:r>
-                        <a:rPr lang="de-DE" sz="2000" dirty="0" smtClean="0"/>
-                        <a:t> </a:t>
-                      </a:r>
-                      <a:r>
-                        <a:rPr lang="de-DE" sz="2000" dirty="0" err="1" smtClean="0"/>
-                        <a:t>files</a:t>
-                      </a:r>
-                      <a:r>
-                        <a:rPr lang="de-DE" sz="2000" dirty="0" smtClean="0"/>
-                        <a:t> </a:t>
-                      </a:r>
-                      <a:r>
-                        <a:rPr lang="de-DE" sz="2000" dirty="0" err="1" smtClean="0"/>
-                        <a:t>to</a:t>
-                      </a:r>
-                      <a:r>
-                        <a:rPr lang="de-DE" sz="2000" dirty="0" smtClean="0"/>
-                        <a:t> </a:t>
-                      </a:r>
-                      <a:r>
-                        <a:rPr lang="de-DE" sz="2000" dirty="0" err="1" smtClean="0"/>
-                        <a:t>be</a:t>
-                      </a:r>
-                      <a:r>
-                        <a:rPr lang="de-DE" sz="2000" dirty="0" smtClean="0"/>
-                        <a:t> </a:t>
-                      </a:r>
-                      <a:r>
-                        <a:rPr lang="de-DE" sz="2000" dirty="0" err="1" smtClean="0"/>
-                        <a:t>checked</a:t>
-                      </a:r>
-                      <a:r>
-                        <a:rPr lang="de-DE" sz="2000" dirty="0" smtClean="0"/>
-                        <a:t> </a:t>
-                      </a:r>
-                      <a:r>
-                        <a:rPr lang="de-DE" sz="2000" dirty="0" err="1" smtClean="0"/>
-                        <a:t>is</a:t>
-                      </a:r>
-                      <a:r>
-                        <a:rPr lang="de-DE" sz="2000" dirty="0" smtClean="0"/>
-                        <a:t> </a:t>
-                      </a:r>
-                      <a:r>
-                        <a:rPr lang="de-DE" sz="2000" i="1" dirty="0" err="1" smtClean="0"/>
-                        <a:t>never</a:t>
-                      </a:r>
-                      <a:r>
-                        <a:rPr lang="de-DE" sz="2000" dirty="0" smtClean="0"/>
-                        <a:t> </a:t>
-                      </a:r>
-                      <a:r>
-                        <a:rPr lang="de-DE" sz="2000" dirty="0" err="1" smtClean="0"/>
-                        <a:t>altered</a:t>
-                      </a:r>
-                      <a:r>
-                        <a:rPr lang="de-DE" sz="2000" dirty="0" smtClean="0"/>
-                        <a:t>.</a:t>
-                      </a:r>
-                      <a:endParaRPr lang="de-DE" sz="2000" dirty="0"/>
-                    </a:p>
-                  </a:txBody>
-                  <a:tcPr/>
-                </a:tc>
-              </a:tr>
-              <a:tr h="370840">
-                <a:tc>
-                  <a:txBody>
-                    <a:bodyPr/>
-                    <a:lstStyle/>
-                    <a:p>
-                      <a:r>
-                        <a:rPr lang="de-DE" dirty="0" smtClean="0"/>
-                        <a:t>2</a:t>
-                      </a:r>
-                      <a:endParaRPr lang="de-DE" dirty="0"/>
-                    </a:p>
-                  </a:txBody>
-                  <a:tcPr/>
-                </a:tc>
-                <a:tc>
-                  <a:txBody>
-                    <a:bodyPr/>
-                    <a:lstStyle/>
-                    <a:p>
-                      <a:r>
-                        <a:rPr lang="de-DE" sz="2400" dirty="0" smtClean="0"/>
-                        <a:t>Correctness</a:t>
-                      </a:r>
-                      <a:endParaRPr lang="de-DE" sz="2400" dirty="0"/>
-                    </a:p>
-                  </a:txBody>
-                  <a:tcPr/>
-                </a:tc>
-                <a:tc>
-                  <a:txBody>
-                    <a:bodyPr/>
-                    <a:lstStyle/>
-                    <a:p>
-                      <a:r>
-                        <a:rPr lang="de-DE" sz="2000" dirty="0" smtClean="0"/>
-                        <a:t>Correctness </a:t>
-                      </a:r>
-                      <a:r>
-                        <a:rPr lang="de-DE" sz="2000" dirty="0" err="1" smtClean="0"/>
-                        <a:t>of</a:t>
-                      </a:r>
-                      <a:r>
-                        <a:rPr lang="de-DE" sz="2000" dirty="0" smtClean="0"/>
-                        <a:t> </a:t>
-                      </a:r>
-                      <a:r>
-                        <a:rPr lang="de-DE" sz="2000" dirty="0" err="1" smtClean="0"/>
-                        <a:t>every</a:t>
-                      </a:r>
-                      <a:r>
-                        <a:rPr lang="de-DE" sz="2000" dirty="0" smtClean="0"/>
-                        <a:t> </a:t>
-                      </a:r>
-                      <a:r>
-                        <a:rPr lang="de-DE" sz="2000" dirty="0" err="1" smtClean="0"/>
-                        <a:t>checker</a:t>
-                      </a:r>
-                      <a:r>
-                        <a:rPr lang="de-DE" sz="2000" dirty="0" smtClean="0"/>
-                        <a:t> </a:t>
-                      </a:r>
-                      <a:r>
-                        <a:rPr lang="de-DE" sz="2000" dirty="0" err="1" smtClean="0"/>
-                        <a:t>is</a:t>
-                      </a:r>
-                      <a:r>
-                        <a:rPr lang="de-DE" sz="2000" dirty="0" smtClean="0"/>
-                        <a:t> </a:t>
-                      </a:r>
-                      <a:r>
-                        <a:rPr lang="de-DE" sz="2000" dirty="0" err="1" smtClean="0"/>
-                        <a:t>automatically</a:t>
-                      </a:r>
-                      <a:r>
-                        <a:rPr lang="de-DE" sz="2000" dirty="0" smtClean="0"/>
-                        <a:t> </a:t>
-                      </a:r>
-                      <a:r>
-                        <a:rPr lang="de-DE" sz="2000" dirty="0" err="1" smtClean="0"/>
-                        <a:t>tested</a:t>
-                      </a:r>
-                      <a:r>
-                        <a:rPr lang="de-DE" sz="2000" dirty="0" smtClean="0"/>
-                        <a:t> </a:t>
-                      </a:r>
-                      <a:r>
-                        <a:rPr lang="de-DE" sz="2000" dirty="0" err="1" smtClean="0"/>
-                        <a:t>for</a:t>
-                      </a:r>
-                      <a:r>
-                        <a:rPr lang="de-DE" sz="2000" dirty="0" smtClean="0"/>
-                        <a:t> positive AND negative </a:t>
-                      </a:r>
-                      <a:r>
-                        <a:rPr lang="de-DE" sz="2000" dirty="0" err="1" smtClean="0"/>
-                        <a:t>cases</a:t>
-                      </a:r>
-                      <a:endParaRPr lang="de-DE" sz="2000" dirty="0"/>
-                    </a:p>
-                  </a:txBody>
-                  <a:tcPr/>
-                </a:tc>
-              </a:tr>
-              <a:tr h="370840">
-                <a:tc>
-                  <a:txBody>
-                    <a:bodyPr/>
-                    <a:lstStyle/>
-                    <a:p>
-                      <a:r>
-                        <a:rPr lang="de-DE" dirty="0" smtClean="0"/>
-                        <a:t>3</a:t>
-                      </a:r>
-                      <a:endParaRPr lang="de-DE" dirty="0"/>
-                    </a:p>
-                  </a:txBody>
-                  <a:tcPr/>
-                </a:tc>
-                <a:tc>
-                  <a:txBody>
-                    <a:bodyPr/>
-                    <a:lstStyle/>
-                    <a:p>
-                      <a:r>
-                        <a:rPr lang="de-DE" sz="2400" dirty="0" smtClean="0"/>
-                        <a:t>Correctness</a:t>
-                      </a:r>
-                      <a:endParaRPr lang="de-DE" sz="2400" dirty="0"/>
-                    </a:p>
-                  </a:txBody>
-                  <a:tcPr/>
-                </a:tc>
-                <a:tc>
-                  <a:txBody>
-                    <a:bodyPr/>
-                    <a:lstStyle/>
-                    <a:p>
-                      <a:r>
-                        <a:rPr lang="de-DE" sz="2000" dirty="0" smtClean="0"/>
-                        <a:t>Every </a:t>
-                      </a:r>
-                      <a:r>
-                        <a:rPr lang="de-DE" sz="2000" dirty="0" err="1" smtClean="0"/>
-                        <a:t>reporting</a:t>
-                      </a:r>
-                      <a:r>
-                        <a:rPr lang="de-DE" sz="2000" dirty="0" smtClean="0"/>
-                        <a:t> </a:t>
-                      </a:r>
-                      <a:r>
-                        <a:rPr lang="de-DE" sz="2000" dirty="0" err="1" smtClean="0"/>
-                        <a:t>format</a:t>
-                      </a:r>
-                      <a:r>
-                        <a:rPr lang="de-DE" sz="2000" dirty="0" smtClean="0"/>
-                        <a:t> </a:t>
-                      </a:r>
-                      <a:r>
-                        <a:rPr lang="de-DE" sz="2000" dirty="0" err="1" smtClean="0"/>
-                        <a:t>is</a:t>
-                      </a:r>
-                      <a:r>
-                        <a:rPr lang="de-DE" sz="2000" dirty="0" smtClean="0"/>
-                        <a:t> </a:t>
-                      </a:r>
-                      <a:r>
-                        <a:rPr lang="de-DE" sz="2000" dirty="0" err="1" smtClean="0"/>
-                        <a:t>tested</a:t>
-                      </a:r>
-                      <a:r>
-                        <a:rPr lang="de-DE" sz="2000" dirty="0" smtClean="0"/>
-                        <a:t>: Reports must </a:t>
-                      </a:r>
-                      <a:r>
-                        <a:rPr lang="de-DE" sz="2000" dirty="0" err="1" smtClean="0"/>
-                        <a:t>exactly</a:t>
-                      </a:r>
-                      <a:r>
-                        <a:rPr lang="de-DE" sz="2000" dirty="0" smtClean="0"/>
-                        <a:t> </a:t>
-                      </a:r>
-                      <a:r>
-                        <a:rPr lang="de-DE" sz="2000" dirty="0" err="1" smtClean="0"/>
-                        <a:t>reflect</a:t>
-                      </a:r>
-                      <a:r>
-                        <a:rPr lang="de-DE" sz="2000" dirty="0" smtClean="0"/>
-                        <a:t> </a:t>
-                      </a:r>
-                      <a:r>
-                        <a:rPr lang="de-DE" sz="2000" dirty="0" err="1" smtClean="0"/>
-                        <a:t>checking</a:t>
-                      </a:r>
-                      <a:r>
-                        <a:rPr lang="de-DE" sz="2000" dirty="0" smtClean="0"/>
-                        <a:t> </a:t>
-                      </a:r>
-                      <a:r>
-                        <a:rPr lang="de-DE" sz="2000" dirty="0" err="1" smtClean="0"/>
-                        <a:t>results</a:t>
-                      </a:r>
-                      <a:r>
-                        <a:rPr lang="de-DE" sz="2000" dirty="0" smtClean="0"/>
-                        <a:t>.</a:t>
-                      </a:r>
-                      <a:endParaRPr lang="de-DE" sz="2000" dirty="0"/>
-                    </a:p>
-                  </a:txBody>
-                  <a:tcPr/>
-                </a:tc>
-              </a:tr>
-              <a:tr h="370840">
-                <a:tc>
-                  <a:txBody>
-                    <a:bodyPr/>
-                    <a:lstStyle/>
-                    <a:p>
-                      <a:r>
-                        <a:rPr lang="de-DE" dirty="0" smtClean="0"/>
-                        <a:t>3</a:t>
-                      </a:r>
-                      <a:endParaRPr lang="de-DE" dirty="0"/>
-                    </a:p>
-                  </a:txBody>
-                  <a:tcPr/>
-                </a:tc>
-                <a:tc>
-                  <a:txBody>
-                    <a:bodyPr/>
-                    <a:lstStyle/>
-                    <a:p>
-                      <a:r>
-                        <a:rPr lang="de-DE" sz="2400" dirty="0" smtClean="0"/>
-                        <a:t>Performance</a:t>
-                      </a:r>
-                      <a:endParaRPr lang="de-DE" sz="2400" dirty="0"/>
-                    </a:p>
-                  </a:txBody>
-                  <a:tcPr/>
-                </a:tc>
-                <a:tc>
-                  <a:txBody>
-                    <a:bodyPr/>
-                    <a:lstStyle/>
-                    <a:p>
-                      <a:r>
-                        <a:rPr lang="de-DE" sz="2000" dirty="0" smtClean="0"/>
-                        <a:t>Check </a:t>
-                      </a:r>
-                      <a:r>
-                        <a:rPr lang="de-DE" sz="2000" dirty="0" err="1" smtClean="0"/>
-                        <a:t>of</a:t>
-                      </a:r>
-                      <a:r>
-                        <a:rPr lang="de-DE" sz="2000" dirty="0" smtClean="0"/>
-                        <a:t> 100kB </a:t>
-                      </a:r>
-                      <a:r>
-                        <a:rPr lang="de-DE" sz="2000" dirty="0" err="1" smtClean="0"/>
-                        <a:t>html</a:t>
-                      </a:r>
-                      <a:r>
-                        <a:rPr lang="de-DE" sz="2000" dirty="0" smtClean="0"/>
-                        <a:t> </a:t>
-                      </a:r>
-                      <a:r>
-                        <a:rPr lang="de-DE" sz="2000" dirty="0" err="1" smtClean="0"/>
-                        <a:t>file</a:t>
-                      </a:r>
-                      <a:r>
-                        <a:rPr lang="de-DE" sz="2000" dirty="0" smtClean="0"/>
-                        <a:t> </a:t>
-                      </a:r>
-                      <a:r>
-                        <a:rPr lang="de-DE" sz="2000" dirty="0" err="1" smtClean="0"/>
-                        <a:t>performed</a:t>
-                      </a:r>
-                      <a:r>
-                        <a:rPr lang="de-DE" sz="2000" dirty="0" smtClean="0"/>
-                        <a:t> </a:t>
-                      </a:r>
-                      <a:r>
-                        <a:rPr lang="de-DE" sz="2000" dirty="0" err="1" smtClean="0"/>
-                        <a:t>under</a:t>
-                      </a:r>
-                      <a:r>
-                        <a:rPr lang="de-DE" sz="2000" dirty="0" smtClean="0"/>
-                        <a:t> 10 </a:t>
-                      </a:r>
-                      <a:r>
-                        <a:rPr lang="de-DE" sz="2000" dirty="0" err="1" smtClean="0"/>
-                        <a:t>secs</a:t>
-                      </a:r>
-                      <a:r>
-                        <a:rPr lang="de-DE" sz="2000" dirty="0" smtClean="0"/>
-                        <a:t> (</a:t>
-                      </a:r>
-                      <a:r>
-                        <a:rPr lang="de-DE" sz="2000" dirty="0" err="1" smtClean="0"/>
-                        <a:t>excluding</a:t>
-                      </a:r>
-                      <a:r>
-                        <a:rPr lang="de-DE" sz="2000" dirty="0" smtClean="0"/>
-                        <a:t> </a:t>
-                      </a:r>
-                      <a:r>
-                        <a:rPr lang="de-DE" sz="2000" dirty="0" err="1" smtClean="0"/>
-                        <a:t>gradle</a:t>
-                      </a:r>
-                      <a:r>
-                        <a:rPr lang="de-DE" sz="2000" dirty="0" smtClean="0"/>
-                        <a:t> </a:t>
-                      </a:r>
-                      <a:r>
-                        <a:rPr lang="de-DE" sz="2000" dirty="0" err="1" smtClean="0"/>
-                        <a:t>startup</a:t>
-                      </a:r>
-                      <a:r>
-                        <a:rPr lang="de-DE" sz="2000" dirty="0" smtClean="0"/>
-                        <a:t>)</a:t>
-                      </a:r>
-                      <a:endParaRPr lang="de-DE" sz="2000" dirty="0"/>
-                    </a:p>
-                  </a:txBody>
-                  <a:tcPr/>
-                </a:tc>
-              </a:tr>
-            </a:tbl>
-          </a:graphicData>
-        </a:graphic>
-      </p:graphicFrame>
-    </p:spTree>
-    <p:extLst>
-      <p:ext uri="{BB962C8B-B14F-4D97-AF65-F5344CB8AC3E}">
-        <p14:creationId xmlns:p14="http://schemas.microsoft.com/office/powerpoint/2010/main" val="772483709"/>
       </p:ext>
     </p:extLst>
   </p:cSld>
@@ -9246,6 +9916,326 @@
       </a:hlink>
       <a:folHlink>
         <a:srgbClr val="837F16"/>
+      </a:folHlink>
+    </a:clrScheme>
+    <a:fontScheme name="Office">
+      <a:majorFont>
+        <a:latin typeface="Calibri"/>
+        <a:ea typeface=""/>
+        <a:cs typeface=""/>
+        <a:font script="Jpan" typeface="ＭＳ Ｐゴシック"/>
+        <a:font script="Hang" typeface="맑은 고딕"/>
+        <a:font script="Hans" typeface="宋体"/>
+        <a:font script="Hant" typeface="新細明體"/>
+        <a:font script="Arab" typeface="Times New Roman"/>
+        <a:font script="Hebr" typeface="Times New Roman"/>
+        <a:font script="Thai" typeface="Angsana New"/>
+        <a:font script="Ethi" typeface="Nyala"/>
+        <a:font script="Beng" typeface="Vrinda"/>
+        <a:font script="Gujr" typeface="Shruti"/>
+        <a:font script="Khmr" typeface="MoolBoran"/>
+        <a:font script="Knda" typeface="Tunga"/>
+        <a:font script="Guru" typeface="Raavi"/>
+        <a:font script="Cans" typeface="Euphemia"/>
+        <a:font script="Cher" typeface="Plantagenet Cherokee"/>
+        <a:font script="Yiii" typeface="Microsoft Yi Baiti"/>
+        <a:font script="Tibt" typeface="Microsoft Himalaya"/>
+        <a:font script="Thaa" typeface="MV Boli"/>
+        <a:font script="Deva" typeface="Mangal"/>
+        <a:font script="Telu" typeface="Gautami"/>
+        <a:font script="Taml" typeface="Latha"/>
+        <a:font script="Syrc" typeface="Estrangelo Edessa"/>
+        <a:font script="Orya" typeface="Kalinga"/>
+        <a:font script="Mlym" typeface="Kartika"/>
+        <a:font script="Laoo" typeface="DokChampa"/>
+        <a:font script="Sinh" typeface="Iskoola Pota"/>
+        <a:font script="Mong" typeface="Mongolian Baiti"/>
+        <a:font script="Viet" typeface="Times New Roman"/>
+        <a:font script="Uigh" typeface="Microsoft Uighur"/>
+        <a:font script="Geor" typeface="Sylfaen"/>
+      </a:majorFont>
+      <a:minorFont>
+        <a:latin typeface="Calibri"/>
+        <a:ea typeface=""/>
+        <a:cs typeface=""/>
+        <a:font script="Jpan" typeface="ＭＳ Ｐゴシック"/>
+        <a:font script="Hang" typeface="맑은 고딕"/>
+        <a:font script="Hans" typeface="宋体"/>
+        <a:font script="Hant" typeface="新細明體"/>
+        <a:font script="Arab" typeface="Arial"/>
+        <a:font script="Hebr" typeface="Arial"/>
+        <a:font script="Thai" typeface="Cordia New"/>
+        <a:font script="Ethi" typeface="Nyala"/>
+        <a:font script="Beng" typeface="Vrinda"/>
+        <a:font script="Gujr" typeface="Shruti"/>
+        <a:font script="Khmr" typeface="DaunPenh"/>
+        <a:font script="Knda" typeface="Tunga"/>
+        <a:font script="Guru" typeface="Raavi"/>
+        <a:font script="Cans" typeface="Euphemia"/>
+        <a:font script="Cher" typeface="Plantagenet Cherokee"/>
+        <a:font script="Yiii" typeface="Microsoft Yi Baiti"/>
+        <a:font script="Tibt" typeface="Microsoft Himalaya"/>
+        <a:font script="Thaa" typeface="MV Boli"/>
+        <a:font script="Deva" typeface="Mangal"/>
+        <a:font script="Telu" typeface="Gautami"/>
+        <a:font script="Taml" typeface="Latha"/>
+        <a:font script="Syrc" typeface="Estrangelo Edessa"/>
+        <a:font script="Orya" typeface="Kalinga"/>
+        <a:font script="Mlym" typeface="Kartika"/>
+        <a:font script="Laoo" typeface="DokChampa"/>
+        <a:font script="Sinh" typeface="Iskoola Pota"/>
+        <a:font script="Mong" typeface="Mongolian Baiti"/>
+        <a:font script="Viet" typeface="Arial"/>
+        <a:font script="Uigh" typeface="Microsoft Uighur"/>
+        <a:font script="Geor" typeface="Sylfaen"/>
+      </a:minorFont>
+    </a:fontScheme>
+    <a:fmtScheme name="Office">
+      <a:fillStyleLst>
+        <a:solidFill>
+          <a:schemeClr val="phClr"/>
+        </a:solidFill>
+        <a:gradFill rotWithShape="1">
+          <a:gsLst>
+            <a:gs pos="0">
+              <a:schemeClr val="phClr">
+                <a:tint val="50000"/>
+                <a:satMod val="300000"/>
+              </a:schemeClr>
+            </a:gs>
+            <a:gs pos="35000">
+              <a:schemeClr val="phClr">
+                <a:tint val="37000"/>
+                <a:satMod val="300000"/>
+              </a:schemeClr>
+            </a:gs>
+            <a:gs pos="100000">
+              <a:schemeClr val="phClr">
+                <a:tint val="15000"/>
+                <a:satMod val="350000"/>
+              </a:schemeClr>
+            </a:gs>
+          </a:gsLst>
+          <a:lin ang="16200000" scaled="1"/>
+        </a:gradFill>
+        <a:gradFill rotWithShape="1">
+          <a:gsLst>
+            <a:gs pos="0">
+              <a:schemeClr val="phClr">
+                <a:tint val="100000"/>
+                <a:shade val="100000"/>
+                <a:satMod val="130000"/>
+              </a:schemeClr>
+            </a:gs>
+            <a:gs pos="100000">
+              <a:schemeClr val="phClr">
+                <a:tint val="50000"/>
+                <a:shade val="100000"/>
+                <a:satMod val="350000"/>
+              </a:schemeClr>
+            </a:gs>
+          </a:gsLst>
+          <a:lin ang="16200000" scaled="0"/>
+        </a:gradFill>
+      </a:fillStyleLst>
+      <a:lnStyleLst>
+        <a:ln w="9525" cap="flat" cmpd="sng" algn="ctr">
+          <a:solidFill>
+            <a:schemeClr val="phClr">
+              <a:shade val="95000"/>
+              <a:satMod val="105000"/>
+            </a:schemeClr>
+          </a:solidFill>
+          <a:prstDash val="solid"/>
+        </a:ln>
+        <a:ln w="25400" cap="flat" cmpd="sng" algn="ctr">
+          <a:solidFill>
+            <a:schemeClr val="phClr"/>
+          </a:solidFill>
+          <a:prstDash val="solid"/>
+        </a:ln>
+        <a:ln w="38100" cap="flat" cmpd="sng" algn="ctr">
+          <a:solidFill>
+            <a:schemeClr val="phClr"/>
+          </a:solidFill>
+          <a:prstDash val="solid"/>
+        </a:ln>
+      </a:lnStyleLst>
+      <a:effectStyleLst>
+        <a:effectStyle>
+          <a:effectLst>
+            <a:outerShdw blurRad="40000" dist="20000" dir="5400000" rotWithShape="0">
+              <a:srgbClr val="000000">
+                <a:alpha val="38000"/>
+              </a:srgbClr>
+            </a:outerShdw>
+          </a:effectLst>
+        </a:effectStyle>
+        <a:effectStyle>
+          <a:effectLst>
+            <a:outerShdw blurRad="40000" dist="23000" dir="5400000" rotWithShape="0">
+              <a:srgbClr val="000000">
+                <a:alpha val="35000"/>
+              </a:srgbClr>
+            </a:outerShdw>
+          </a:effectLst>
+        </a:effectStyle>
+        <a:effectStyle>
+          <a:effectLst>
+            <a:outerShdw blurRad="40000" dist="23000" dir="5400000" rotWithShape="0">
+              <a:srgbClr val="000000">
+                <a:alpha val="35000"/>
+              </a:srgbClr>
+            </a:outerShdw>
+          </a:effectLst>
+          <a:scene3d>
+            <a:camera prst="orthographicFront">
+              <a:rot lat="0" lon="0" rev="0"/>
+            </a:camera>
+            <a:lightRig rig="threePt" dir="t">
+              <a:rot lat="0" lon="0" rev="1200000"/>
+            </a:lightRig>
+          </a:scene3d>
+          <a:sp3d>
+            <a:bevelT w="63500" h="25400"/>
+          </a:sp3d>
+        </a:effectStyle>
+      </a:effectStyleLst>
+      <a:bgFillStyleLst>
+        <a:solidFill>
+          <a:schemeClr val="phClr"/>
+        </a:solidFill>
+        <a:gradFill rotWithShape="1">
+          <a:gsLst>
+            <a:gs pos="0">
+              <a:schemeClr val="phClr">
+                <a:tint val="40000"/>
+                <a:satMod val="350000"/>
+              </a:schemeClr>
+            </a:gs>
+            <a:gs pos="40000">
+              <a:schemeClr val="phClr">
+                <a:tint val="45000"/>
+                <a:shade val="99000"/>
+                <a:satMod val="350000"/>
+              </a:schemeClr>
+            </a:gs>
+            <a:gs pos="100000">
+              <a:schemeClr val="phClr">
+                <a:shade val="20000"/>
+                <a:satMod val="255000"/>
+              </a:schemeClr>
+            </a:gs>
+          </a:gsLst>
+          <a:path path="circle">
+            <a:fillToRect l="50000" t="-80000" r="50000" b="180000"/>
+          </a:path>
+        </a:gradFill>
+        <a:gradFill rotWithShape="1">
+          <a:gsLst>
+            <a:gs pos="0">
+              <a:schemeClr val="phClr">
+                <a:tint val="80000"/>
+                <a:satMod val="300000"/>
+              </a:schemeClr>
+            </a:gs>
+            <a:gs pos="100000">
+              <a:schemeClr val="phClr">
+                <a:shade val="30000"/>
+                <a:satMod val="200000"/>
+              </a:schemeClr>
+            </a:gs>
+          </a:gsLst>
+          <a:path path="circle">
+            <a:fillToRect l="50000" t="50000" r="50000" b="50000"/>
+          </a:path>
+        </a:gradFill>
+      </a:bgFillStyleLst>
+    </a:fmtScheme>
+  </a:themeElements>
+  <a:objectDefaults>
+    <a:spDef>
+      <a:spPr/>
+      <a:bodyPr/>
+      <a:lstStyle/>
+      <a:style>
+        <a:lnRef idx="1">
+          <a:schemeClr val="accent1"/>
+        </a:lnRef>
+        <a:fillRef idx="3">
+          <a:schemeClr val="accent1"/>
+        </a:fillRef>
+        <a:effectRef idx="2">
+          <a:schemeClr val="accent1"/>
+        </a:effectRef>
+        <a:fontRef idx="minor">
+          <a:schemeClr val="lt1"/>
+        </a:fontRef>
+      </a:style>
+    </a:spDef>
+    <a:lnDef>
+      <a:spPr/>
+      <a:bodyPr/>
+      <a:lstStyle/>
+      <a:style>
+        <a:lnRef idx="2">
+          <a:schemeClr val="accent1"/>
+        </a:lnRef>
+        <a:fillRef idx="0">
+          <a:schemeClr val="accent1"/>
+        </a:fillRef>
+        <a:effectRef idx="1">
+          <a:schemeClr val="accent1"/>
+        </a:effectRef>
+        <a:fontRef idx="minor">
+          <a:schemeClr val="tx1"/>
+        </a:fontRef>
+      </a:style>
+    </a:lnDef>
+  </a:objectDefaults>
+  <a:extraClrSchemeLst/>
+</a:theme>
+</file>
+
+<file path=ppt/theme/theme2.xml><?xml version="1.0" encoding="utf-8"?>
+<a:theme xmlns:a="http://schemas.openxmlformats.org/drawingml/2006/main" name="Office-Design">
+  <a:themeElements>
+    <a:clrScheme name="Office">
+      <a:dk1>
+        <a:sysClr val="windowText" lastClr="000000"/>
+      </a:dk1>
+      <a:lt1>
+        <a:sysClr val="window" lastClr="FFFFFF"/>
+      </a:lt1>
+      <a:dk2>
+        <a:srgbClr val="1F497D"/>
+      </a:dk2>
+      <a:lt2>
+        <a:srgbClr val="EEECE1"/>
+      </a:lt2>
+      <a:accent1>
+        <a:srgbClr val="4F81BD"/>
+      </a:accent1>
+      <a:accent2>
+        <a:srgbClr val="C0504D"/>
+      </a:accent2>
+      <a:accent3>
+        <a:srgbClr val="9BBB59"/>
+      </a:accent3>
+      <a:accent4>
+        <a:srgbClr val="8064A2"/>
+      </a:accent4>
+      <a:accent5>
+        <a:srgbClr val="4BACC6"/>
+      </a:accent5>
+      <a:accent6>
+        <a:srgbClr val="F79646"/>
+      </a:accent6>
+      <a:hlink>
+        <a:srgbClr val="0000FF"/>
+      </a:hlink>
+      <a:folHlink>
+        <a:srgbClr val="800080"/>
       </a:folHlink>
     </a:clrScheme>
     <a:fontScheme name="Office">

</xml_diff>